<commit_message>
Edited the PowerPoint a bit
</commit_message>
<xml_diff>
--- a/docs/GUIMAP.pptx
+++ b/docs/GUIMAP.pptx
@@ -10,8 +10,8 @@
     <p:sldId id="258" r:id="rId4"/>
     <p:sldId id="259" r:id="rId5"/>
     <p:sldId id="260" r:id="rId6"/>
-    <p:sldId id="261" r:id="rId7"/>
-    <p:sldId id="262" r:id="rId8"/>
+    <p:sldId id="262" r:id="rId7"/>
+    <p:sldId id="261" r:id="rId8"/>
     <p:sldId id="263" r:id="rId9"/>
     <p:sldId id="264" r:id="rId10"/>
     <p:sldId id="265" r:id="rId11"/>
@@ -19,8 +19,7 @@
     <p:sldId id="267" r:id="rId13"/>
     <p:sldId id="268" r:id="rId14"/>
     <p:sldId id="269" r:id="rId15"/>
-    <p:sldId id="270" r:id="rId16"/>
-    <p:sldId id="271" r:id="rId17"/>
+    <p:sldId id="271" r:id="rId16"/>
   </p:sldIdLst>
   <p:sldSz cx="12192000" cy="6858000"/>
   <p:notesSz cx="6858000" cy="9144000"/>
@@ -3563,8 +3562,8 @@
         </p:nvSpPr>
         <p:spPr>
           <a:xfrm>
-            <a:off x="1743828" y="4111201"/>
-            <a:ext cx="8654267" cy="1124073"/>
+            <a:off x="1742038" y="3635975"/>
+            <a:ext cx="8654267" cy="688911"/>
           </a:xfrm>
         </p:spPr>
         <p:txBody>
@@ -3599,53 +3598,53 @@
         </p:nvSpPr>
         <p:spPr>
           <a:xfrm>
-            <a:off x="1742038" y="5235274"/>
+            <a:off x="1767971" y="4416754"/>
             <a:ext cx="8656058" cy="1438991"/>
           </a:xfrm>
         </p:spPr>
         <p:txBody>
           <a:bodyPr anchor="t">
-            <a:normAutofit fontScale="32500" lnSpcReduction="20000"/>
+            <a:noAutofit/>
           </a:bodyPr>
           <a:lstStyle/>
           <a:p>
             <a:pPr algn="ctr"/>
             <a:r>
-              <a:rPr lang="en-US" sz="3200" dirty="0"/>
+              <a:rPr lang="en-US" sz="1400" dirty="0"/>
               <a:t>Date: April 20, 2022</a:t>
             </a:r>
           </a:p>
           <a:p>
             <a:pPr algn="ctr"/>
             <a:r>
-              <a:rPr lang="en-US" sz="3200" dirty="0"/>
+              <a:rPr lang="en-US" sz="1400" dirty="0"/>
               <a:t>Student: Hayden Ackerman</a:t>
             </a:r>
           </a:p>
           <a:p>
             <a:pPr algn="ctr"/>
             <a:r>
-              <a:rPr lang="en-US" sz="3200" dirty="0"/>
+              <a:rPr lang="en-US" sz="1400" dirty="0"/>
               <a:t>Major: Cybersecurity</a:t>
             </a:r>
           </a:p>
           <a:p>
             <a:pPr algn="ctr"/>
             <a:r>
-              <a:rPr lang="en-US" sz="3200" dirty="0"/>
+              <a:rPr lang="en-US" sz="1400" dirty="0"/>
               <a:t>Course: CSCI 499 Defense</a:t>
             </a:r>
           </a:p>
           <a:p>
             <a:pPr algn="ctr"/>
             <a:r>
-              <a:rPr lang="en-US" sz="3200" dirty="0"/>
+              <a:rPr lang="en-US" sz="1400" dirty="0"/>
               <a:t>Advisor: Dr. Hayes</a:t>
             </a:r>
           </a:p>
           <a:p>
             <a:pPr algn="ctr"/>
-            <a:endParaRPr lang="en-US" dirty="0"/>
+            <a:endParaRPr lang="en-US" sz="1400" dirty="0"/>
           </a:p>
         </p:txBody>
       </p:sp>
@@ -5887,13 +5886,19 @@
           <a:p>
             <a:r>
               <a:rPr lang="en-US" dirty="0"/>
-              <a:t>In terms of performance with minimal scan options, no performance issues were thread. However, depending on the scan option, performance might degrade.</a:t>
+              <a:t>In terms of performance with minimal scan options, no performance issues were observed. However, depending on the scan option, performance might degrade.</a:t>
             </a:r>
           </a:p>
           <a:p>
             <a:r>
               <a:rPr lang="en-US" dirty="0"/>
               <a:t>Functional Requirements: All scans can be completed if a network connection is active, and results can be saved to a preferred file format. The user can easily view their results.</a:t>
+            </a:r>
+          </a:p>
+          <a:p>
+            <a:r>
+              <a:rPr lang="en-US" dirty="0"/>
+              <a:t>See documentation for additional details.</a:t>
             </a:r>
           </a:p>
         </p:txBody>
@@ -5952,7 +5957,7 @@
             <a:pPr algn="ctr"/>
             <a:r>
               <a:rPr lang="en-US" dirty="0"/>
-              <a:t>Challenges</a:t>
+              <a:t>Challenges &amp; Future Enhancements</a:t>
             </a:r>
           </a:p>
         </p:txBody>
@@ -6064,7 +6069,7 @@
             <a:pPr algn="ctr"/>
             <a:r>
               <a:rPr lang="en-US" dirty="0"/>
-              <a:t>Not Overcome</a:t>
+              <a:t>Future Enhancements</a:t>
             </a:r>
           </a:p>
         </p:txBody>
@@ -6092,19 +6097,25 @@
           <a:p>
             <a:r>
               <a:rPr lang="en-US" dirty="0"/>
-              <a:t>Some threading not locking properly.</a:t>
+              <a:t>Ensure that the project is properly threaded.</a:t>
             </a:r>
           </a:p>
           <a:p>
             <a:r>
               <a:rPr lang="en-US" dirty="0"/>
-              <a:t>Time constraints – always difficult for a full-time student.</a:t>
+              <a:t>Flesh out the GUI with a more granular control scheme. </a:t>
             </a:r>
           </a:p>
           <a:p>
             <a:r>
               <a:rPr lang="en-US" dirty="0"/>
-              <a:t>Not all scan options were tested (too many to test in a single semester). </a:t>
+              <a:t>Test all possible scanning configurations.</a:t>
+            </a:r>
+          </a:p>
+          <a:p>
+            <a:r>
+              <a:rPr lang="en-US" dirty="0"/>
+              <a:t>Learn more Python libraries, so I can incorporate some neat features into my program. </a:t>
             </a:r>
           </a:p>
         </p:txBody>
@@ -6147,12 +6158,138 @@
           <a:chExt cx="0" cy="0"/>
         </a:xfrm>
       </p:grpSpPr>
+      <p:sp>
+        <p:nvSpPr>
+          <p:cNvPr id="9" name="Freeform: Shape 8">
+            <a:extLst>
+              <a:ext uri="{FF2B5EF4-FFF2-40B4-BE49-F238E27FC236}">
+                <a16:creationId xmlns:a16="http://schemas.microsoft.com/office/drawing/2014/main" id="{AE192E3E-68A9-4F36-936C-1C8D0B9EF132}"/>
+              </a:ext>
+              <a:ext uri="{C183D7F6-B498-43B3-948B-1728B52AA6E4}">
+                <adec:decorative xmlns:adec="http://schemas.microsoft.com/office/drawing/2017/decorative" val="1"/>
+              </a:ext>
+            </a:extLst>
+          </p:cNvPr>
+          <p:cNvSpPr>
+            <a:spLocks noGrp="1" noRot="1" noChangeAspect="1" noMove="1" noResize="1" noEditPoints="1" noAdjustHandles="1" noChangeArrowheads="1" noChangeShapeType="1" noTextEdit="1"/>
+          </p:cNvSpPr>
+          <p:nvPr>
+            <p:extLst>
+              <p:ext uri="{386F3935-93C4-4BCD-93E2-E3B085C9AB24}">
+                <p16:designElem xmlns:p16="http://schemas.microsoft.com/office/powerpoint/2015/main" val="1"/>
+              </p:ext>
+            </p:extLst>
+          </p:nvPr>
+        </p:nvSpPr>
+        <p:spPr>
+          <a:xfrm>
+            <a:off x="8803792" y="3455896"/>
+            <a:ext cx="3388208" cy="3406341"/>
+          </a:xfrm>
+          <a:custGeom>
+            <a:avLst/>
+            <a:gdLst>
+              <a:gd name="connsiteX0" fmla="*/ 3388058 w 3388208"/>
+              <a:gd name="connsiteY0" fmla="*/ 0 h 3406341"/>
+              <a:gd name="connsiteX1" fmla="*/ 3388208 w 3388208"/>
+              <a:gd name="connsiteY1" fmla="*/ 0 h 3406341"/>
+              <a:gd name="connsiteX2" fmla="*/ 3388208 w 3388208"/>
+              <a:gd name="connsiteY2" fmla="*/ 3406341 h 3406341"/>
+              <a:gd name="connsiteX3" fmla="*/ 0 w 3388208"/>
+              <a:gd name="connsiteY3" fmla="*/ 3406341 h 3406341"/>
+              <a:gd name="connsiteX4" fmla="*/ 79006 w 3388208"/>
+              <a:gd name="connsiteY4" fmla="*/ 3404386 h 3406341"/>
+              <a:gd name="connsiteX5" fmla="*/ 3383947 w 3388208"/>
+              <a:gd name="connsiteY5" fmla="*/ 164274 h 3406341"/>
+            </a:gdLst>
+            <a:ahLst/>
+            <a:cxnLst>
+              <a:cxn ang="0">
+                <a:pos x="connsiteX0" y="connsiteY0"/>
+              </a:cxn>
+              <a:cxn ang="0">
+                <a:pos x="connsiteX1" y="connsiteY1"/>
+              </a:cxn>
+              <a:cxn ang="0">
+                <a:pos x="connsiteX2" y="connsiteY2"/>
+              </a:cxn>
+              <a:cxn ang="0">
+                <a:pos x="connsiteX3" y="connsiteY3"/>
+              </a:cxn>
+              <a:cxn ang="0">
+                <a:pos x="connsiteX4" y="connsiteY4"/>
+              </a:cxn>
+              <a:cxn ang="0">
+                <a:pos x="connsiteX5" y="connsiteY5"/>
+              </a:cxn>
+            </a:cxnLst>
+            <a:rect l="l" t="t" r="r" b="b"/>
+            <a:pathLst>
+              <a:path w="3388208" h="3406341">
+                <a:moveTo>
+                  <a:pt x="3388058" y="0"/>
+                </a:moveTo>
+                <a:lnTo>
+                  <a:pt x="3388208" y="0"/>
+                </a:lnTo>
+                <a:lnTo>
+                  <a:pt x="3388208" y="3406341"/>
+                </a:lnTo>
+                <a:lnTo>
+                  <a:pt x="0" y="3406341"/>
+                </a:lnTo>
+                <a:lnTo>
+                  <a:pt x="79006" y="3404386"/>
+                </a:lnTo>
+                <a:cubicBezTo>
+                  <a:pt x="1864742" y="3315784"/>
+                  <a:pt x="3296223" y="1912901"/>
+                  <a:pt x="3383947" y="164274"/>
+                </a:cubicBezTo>
+                <a:close/>
+              </a:path>
+            </a:pathLst>
+          </a:custGeom>
+          <a:solidFill>
+            <a:schemeClr val="accent5"/>
+          </a:solidFill>
+          <a:ln>
+            <a:noFill/>
+          </a:ln>
+        </p:spPr>
+        <p:style>
+          <a:lnRef idx="2">
+            <a:schemeClr val="accent1">
+              <a:shade val="50000"/>
+            </a:schemeClr>
+          </a:lnRef>
+          <a:fillRef idx="1">
+            <a:schemeClr val="accent1"/>
+          </a:fillRef>
+          <a:effectRef idx="0">
+            <a:schemeClr val="accent1"/>
+          </a:effectRef>
+          <a:fontRef idx="minor">
+            <a:schemeClr val="lt1"/>
+          </a:fontRef>
+        </p:style>
+        <p:txBody>
+          <a:bodyPr wrap="square" rtlCol="0" anchor="ctr">
+            <a:noAutofit/>
+          </a:bodyPr>
+          <a:lstStyle/>
+          <a:p>
+            <a:pPr algn="ctr"/>
+            <a:endParaRPr lang="en-US"/>
+          </a:p>
+        </p:txBody>
+      </p:sp>
       <p:sp useBgFill="1">
         <p:nvSpPr>
-          <p:cNvPr id="23" name="Rectangle 12">
-            <a:extLst>
-              <a:ext uri="{FF2B5EF4-FFF2-40B4-BE49-F238E27FC236}">
-                <a16:creationId xmlns:a16="http://schemas.microsoft.com/office/drawing/2014/main" id="{D93C0950-3C3C-4FE9-BE59-DAF5AEF993AE}"/>
+          <p:cNvPr id="11" name="Rectangle 10">
+            <a:extLst>
+              <a:ext uri="{FF2B5EF4-FFF2-40B4-BE49-F238E27FC236}">
+                <a16:creationId xmlns:a16="http://schemas.microsoft.com/office/drawing/2014/main" id="{5FDBEA07-A1D3-4F9E-859B-DE0EDC864095}"/>
               </a:ext>
               <a:ext uri="{C183D7F6-B498-43B3-948B-1728B52AA6E4}">
                 <adec:decorative xmlns:adec="http://schemas.microsoft.com/office/drawing/2017/decorative" val="1"/>
@@ -6225,99 +6362,10 @@
       </p:sp>
       <p:sp>
         <p:nvSpPr>
-          <p:cNvPr id="7" name="Title 6">
-            <a:extLst>
-              <a:ext uri="{FF2B5EF4-FFF2-40B4-BE49-F238E27FC236}">
-                <a16:creationId xmlns:a16="http://schemas.microsoft.com/office/drawing/2014/main" id="{F7162B16-8285-410E-A788-3AA45744F3A4}"/>
-              </a:ext>
-            </a:extLst>
-          </p:cNvPr>
-          <p:cNvSpPr>
-            <a:spLocks noGrp="1"/>
-          </p:cNvSpPr>
-          <p:nvPr>
-            <p:ph type="title"/>
-          </p:nvPr>
-        </p:nvSpPr>
-        <p:spPr>
-          <a:xfrm>
-            <a:off x="1077362" y="720435"/>
-            <a:ext cx="6608086" cy="1507375"/>
-          </a:xfrm>
-        </p:spPr>
-        <p:txBody>
-          <a:bodyPr>
-            <a:normAutofit/>
-          </a:bodyPr>
-          <a:lstStyle/>
-          <a:p>
-            <a:pPr algn="ctr"/>
-            <a:r>
-              <a:rPr lang="en-US" dirty="0"/>
-              <a:t>Future Enhancements</a:t>
-            </a:r>
-          </a:p>
-        </p:txBody>
-      </p:sp>
-      <p:sp>
-        <p:nvSpPr>
-          <p:cNvPr id="8" name="Content Placeholder 7">
-            <a:extLst>
-              <a:ext uri="{FF2B5EF4-FFF2-40B4-BE49-F238E27FC236}">
-                <a16:creationId xmlns:a16="http://schemas.microsoft.com/office/drawing/2014/main" id="{98E6FEED-6502-4E81-B876-C4E4E520F2E0}"/>
-              </a:ext>
-            </a:extLst>
-          </p:cNvPr>
-          <p:cNvSpPr>
-            <a:spLocks noGrp="1"/>
-          </p:cNvSpPr>
-          <p:nvPr>
-            <p:ph idx="1"/>
-          </p:nvPr>
-        </p:nvSpPr>
-        <p:spPr>
-          <a:xfrm>
-            <a:off x="1077362" y="2434974"/>
-            <a:ext cx="6608086" cy="3505855"/>
-          </a:xfrm>
-        </p:spPr>
-        <p:txBody>
-          <a:bodyPr>
-            <a:normAutofit/>
-          </a:bodyPr>
-          <a:lstStyle/>
-          <a:p>
-            <a:r>
-              <a:rPr lang="en-US" dirty="0"/>
-              <a:t>Optimize the code to run more efficiently with more scanning options</a:t>
-            </a:r>
-          </a:p>
-          <a:p>
-            <a:r>
-              <a:rPr lang="en-US" dirty="0"/>
-              <a:t>Fix threading issues</a:t>
-            </a:r>
-          </a:p>
-          <a:p>
-            <a:r>
-              <a:rPr lang="en-US" dirty="0"/>
-              <a:t>Extend the GUI to add more functionality</a:t>
-            </a:r>
-          </a:p>
-          <a:p>
-            <a:r>
-              <a:rPr lang="en-US" dirty="0"/>
-              <a:t>Learn more Python, so I can apply what I learn to this project</a:t>
-            </a:r>
-          </a:p>
-        </p:txBody>
-      </p:sp>
-      <p:sp>
-        <p:nvSpPr>
-          <p:cNvPr id="24" name="Rectangle 14">
-            <a:extLst>
-              <a:ext uri="{FF2B5EF4-FFF2-40B4-BE49-F238E27FC236}">
-                <a16:creationId xmlns:a16="http://schemas.microsoft.com/office/drawing/2014/main" id="{4C415DDA-2676-413C-8636-3E46EB18FAAC}"/>
+          <p:cNvPr id="13" name="Rectangle 12">
+            <a:extLst>
+              <a:ext uri="{FF2B5EF4-FFF2-40B4-BE49-F238E27FC236}">
+                <a16:creationId xmlns:a16="http://schemas.microsoft.com/office/drawing/2014/main" id="{53E87B83-CF96-4EE7-950F-863990226F53}"/>
               </a:ext>
               <a:ext uri="{C183D7F6-B498-43B3-948B-1728B52AA6E4}">
                 <adec:decorative xmlns:adec="http://schemas.microsoft.com/office/drawing/2017/decorative" val="1"/>
@@ -6336,9 +6384,9 @@
           </p:nvPr>
         </p:nvSpPr>
         <p:spPr>
-          <a:xfrm>
-            <a:off x="8707925" y="3401303"/>
-            <a:ext cx="3485994" cy="3456698"/>
+          <a:xfrm rot="5400000">
+            <a:off x="53658" y="-55810"/>
+            <a:ext cx="6859721" cy="6967904"/>
           </a:xfrm>
           <a:prstGeom prst="rect">
             <a:avLst/>
@@ -6371,16 +6419,16 @@
           <a:lstStyle/>
           <a:p>
             <a:pPr algn="ctr"/>
-            <a:endParaRPr lang="en-US"/>
-          </a:p>
-        </p:txBody>
-      </p:sp>
-      <p:sp>
-        <p:nvSpPr>
-          <p:cNvPr id="25" name="Rectangle 16">
-            <a:extLst>
-              <a:ext uri="{FF2B5EF4-FFF2-40B4-BE49-F238E27FC236}">
-                <a16:creationId xmlns:a16="http://schemas.microsoft.com/office/drawing/2014/main" id="{9CD5FADB-FB52-448C-9702-2000373C298A}"/>
+            <a:endParaRPr lang="en-US" dirty="0"/>
+          </a:p>
+        </p:txBody>
+      </p:sp>
+      <p:sp useBgFill="1">
+        <p:nvSpPr>
+          <p:cNvPr id="15" name="Freeform: Shape 14">
+            <a:extLst>
+              <a:ext uri="{FF2B5EF4-FFF2-40B4-BE49-F238E27FC236}">
+                <a16:creationId xmlns:a16="http://schemas.microsoft.com/office/drawing/2014/main" id="{407ADFB6-F59B-415B-9EC6-BDB61786C475}"/>
               </a:ext>
               <a:ext uri="{C183D7F6-B498-43B3-948B-1728B52AA6E4}">
                 <adec:decorative xmlns:adec="http://schemas.microsoft.com/office/drawing/2017/decorative" val="1"/>
@@ -6399,13 +6447,271 @@
           </p:nvPr>
         </p:nvSpPr>
         <p:spPr>
-          <a:xfrm rot="10800000">
-            <a:off x="8707923" y="-131"/>
-            <a:ext cx="3488653" cy="3406192"/>
+          <a:xfrm rot="5400000" flipH="1" flipV="1">
+            <a:off x="54516" y="-50314"/>
+            <a:ext cx="6858005" cy="6967903"/>
+          </a:xfrm>
+          <a:custGeom>
+            <a:avLst/>
+            <a:gdLst>
+              <a:gd name="connsiteX0" fmla="*/ 0 w 2559050"/>
+              <a:gd name="connsiteY0" fmla="*/ 0 h 2559050"/>
+              <a:gd name="connsiteX1" fmla="*/ 2559050 w 2559050"/>
+              <a:gd name="connsiteY1" fmla="*/ 0 h 2559050"/>
+              <a:gd name="connsiteX2" fmla="*/ 0 w 2559050"/>
+              <a:gd name="connsiteY2" fmla="*/ 2559050 h 2559050"/>
+            </a:gdLst>
+            <a:ahLst/>
+            <a:cxnLst>
+              <a:cxn ang="0">
+                <a:pos x="connsiteX0" y="connsiteY0"/>
+              </a:cxn>
+              <a:cxn ang="0">
+                <a:pos x="connsiteX1" y="connsiteY1"/>
+              </a:cxn>
+              <a:cxn ang="0">
+                <a:pos x="connsiteX2" y="connsiteY2"/>
+              </a:cxn>
+            </a:cxnLst>
+            <a:rect l="l" t="t" r="r" b="b"/>
+            <a:pathLst>
+              <a:path w="2559050" h="2559050">
+                <a:moveTo>
+                  <a:pt x="0" y="0"/>
+                </a:moveTo>
+                <a:lnTo>
+                  <a:pt x="2559050" y="0"/>
+                </a:lnTo>
+                <a:cubicBezTo>
+                  <a:pt x="2559050" y="1413324"/>
+                  <a:pt x="1413324" y="2559050"/>
+                  <a:pt x="0" y="2559050"/>
+                </a:cubicBezTo>
+                <a:close/>
+              </a:path>
+            </a:pathLst>
+          </a:custGeom>
+          <a:ln>
+            <a:noFill/>
+          </a:ln>
+        </p:spPr>
+        <p:style>
+          <a:lnRef idx="2">
+            <a:schemeClr val="accent1">
+              <a:shade val="50000"/>
+            </a:schemeClr>
+          </a:lnRef>
+          <a:fillRef idx="1">
+            <a:schemeClr val="accent1"/>
+          </a:fillRef>
+          <a:effectRef idx="0">
+            <a:schemeClr val="accent1"/>
+          </a:effectRef>
+          <a:fontRef idx="minor">
+            <a:schemeClr val="lt1"/>
+          </a:fontRef>
+        </p:style>
+        <p:txBody>
+          <a:bodyPr wrap="square" rtlCol="0" anchor="ctr">
+            <a:noAutofit/>
+          </a:bodyPr>
+          <a:lstStyle/>
+          <a:p>
+            <a:pPr algn="ctr"/>
+            <a:endParaRPr lang="en-US">
+              <a:solidFill>
+                <a:schemeClr val="tx1"/>
+              </a:solidFill>
+            </a:endParaRPr>
+          </a:p>
+        </p:txBody>
+      </p:sp>
+      <p:sp>
+        <p:nvSpPr>
+          <p:cNvPr id="4" name="Title 3">
+            <a:extLst>
+              <a:ext uri="{FF2B5EF4-FFF2-40B4-BE49-F238E27FC236}">
+                <a16:creationId xmlns:a16="http://schemas.microsoft.com/office/drawing/2014/main" id="{F3C64553-708A-4173-9EE8-5A2F043ABDCE}"/>
+              </a:ext>
+            </a:extLst>
+          </p:cNvPr>
+          <p:cNvSpPr>
+            <a:spLocks noGrp="1"/>
+          </p:cNvSpPr>
+          <p:nvPr>
+            <p:ph type="title"/>
+          </p:nvPr>
+        </p:nvSpPr>
+        <p:spPr>
+          <a:xfrm>
+            <a:off x="1084728" y="2844177"/>
+            <a:ext cx="4272646" cy="1916084"/>
+          </a:xfrm>
+        </p:spPr>
+        <p:txBody>
+          <a:bodyPr vert="horz" lIns="91440" tIns="45720" rIns="91440" bIns="45720" rtlCol="0" anchor="b">
+            <a:normAutofit/>
+          </a:bodyPr>
+          <a:lstStyle/>
+          <a:p>
+            <a:pPr algn="ctr"/>
+            <a:r>
+              <a:rPr lang="en-US" dirty="0"/>
+              <a:t>Any questions?</a:t>
+            </a:r>
+          </a:p>
+        </p:txBody>
+      </p:sp>
+      <p:sp>
+        <p:nvSpPr>
+          <p:cNvPr id="17" name="Rectangle 16">
+            <a:extLst>
+              <a:ext uri="{FF2B5EF4-FFF2-40B4-BE49-F238E27FC236}">
+                <a16:creationId xmlns:a16="http://schemas.microsoft.com/office/drawing/2014/main" id="{B19BE792-26DE-40FA-A8C8-F3D6378FC9FC}"/>
+              </a:ext>
+              <a:ext uri="{C183D7F6-B498-43B3-948B-1728B52AA6E4}">
+                <adec:decorative xmlns:adec="http://schemas.microsoft.com/office/drawing/2017/decorative" val="1"/>
+              </a:ext>
+            </a:extLst>
+          </p:cNvPr>
+          <p:cNvSpPr>
+            <a:spLocks noGrp="1" noRot="1" noChangeAspect="1" noMove="1" noResize="1" noEditPoints="1" noAdjustHandles="1" noChangeArrowheads="1" noChangeShapeType="1" noTextEdit="1"/>
+          </p:cNvSpPr>
+          <p:nvPr>
+            <p:extLst>
+              <p:ext uri="{386F3935-93C4-4BCD-93E2-E3B085C9AB24}">
+                <p16:designElem xmlns:p16="http://schemas.microsoft.com/office/powerpoint/2015/main" val="1"/>
+              </p:ext>
+            </p:extLst>
+          </p:nvPr>
+        </p:nvSpPr>
+        <p:spPr>
+          <a:xfrm rot="5400000">
+            <a:off x="6988933" y="-21461"/>
+            <a:ext cx="1703094" cy="1746020"/>
           </a:xfrm>
           <a:prstGeom prst="rect">
             <a:avLst/>
           </a:prstGeom>
+          <a:solidFill>
+            <a:schemeClr val="accent1">
+              <a:lumMod val="60000"/>
+              <a:lumOff val="40000"/>
+            </a:schemeClr>
+          </a:solidFill>
+          <a:ln>
+            <a:noFill/>
+          </a:ln>
+        </p:spPr>
+        <p:style>
+          <a:lnRef idx="2">
+            <a:schemeClr val="accent1">
+              <a:shade val="50000"/>
+            </a:schemeClr>
+          </a:lnRef>
+          <a:fillRef idx="1">
+            <a:schemeClr val="accent1"/>
+          </a:fillRef>
+          <a:effectRef idx="0">
+            <a:schemeClr val="accent1"/>
+          </a:effectRef>
+          <a:fontRef idx="minor">
+            <a:schemeClr val="lt1"/>
+          </a:fontRef>
+        </p:style>
+        <p:txBody>
+          <a:bodyPr rtlCol="0" anchor="ctr"/>
+          <a:lstStyle/>
+          <a:p>
+            <a:pPr algn="ctr"/>
+            <a:endParaRPr lang="en-US" dirty="0"/>
+          </a:p>
+        </p:txBody>
+      </p:sp>
+      <p:sp>
+        <p:nvSpPr>
+          <p:cNvPr id="19" name="Rectangle 3">
+            <a:extLst>
+              <a:ext uri="{FF2B5EF4-FFF2-40B4-BE49-F238E27FC236}">
+                <a16:creationId xmlns:a16="http://schemas.microsoft.com/office/drawing/2014/main" id="{11CBEA76-37A2-4726-8123-EBCACA121EF8}"/>
+              </a:ext>
+              <a:ext uri="{C183D7F6-B498-43B3-948B-1728B52AA6E4}">
+                <adec:decorative xmlns:adec="http://schemas.microsoft.com/office/drawing/2017/decorative" val="1"/>
+              </a:ext>
+            </a:extLst>
+          </p:cNvPr>
+          <p:cNvSpPr>
+            <a:spLocks noGrp="1" noRot="1" noChangeAspect="1" noMove="1" noResize="1" noEditPoints="1" noAdjustHandles="1" noChangeArrowheads="1" noChangeShapeType="1" noTextEdit="1"/>
+          </p:cNvSpPr>
+          <p:nvPr>
+            <p:extLst>
+              <p:ext uri="{386F3935-93C4-4BCD-93E2-E3B085C9AB24}">
+                <p16:designElem xmlns:p16="http://schemas.microsoft.com/office/powerpoint/2015/main" val="1"/>
+              </p:ext>
+            </p:extLst>
+          </p:nvPr>
+        </p:nvSpPr>
+        <p:spPr>
+          <a:xfrm rot="5400000">
+            <a:off x="6988055" y="-22336"/>
+            <a:ext cx="1704847" cy="1746021"/>
+          </a:xfrm>
+          <a:custGeom>
+            <a:avLst/>
+            <a:gdLst>
+              <a:gd name="connsiteX0" fmla="*/ 0 w 3488602"/>
+              <a:gd name="connsiteY0" fmla="*/ 0 h 3433573"/>
+              <a:gd name="connsiteX1" fmla="*/ 3488602 w 3488602"/>
+              <a:gd name="connsiteY1" fmla="*/ 0 h 3433573"/>
+              <a:gd name="connsiteX2" fmla="*/ 3488602 w 3488602"/>
+              <a:gd name="connsiteY2" fmla="*/ 3433573 h 3433573"/>
+              <a:gd name="connsiteX3" fmla="*/ 0 w 3488602"/>
+              <a:gd name="connsiteY3" fmla="*/ 3433573 h 3433573"/>
+              <a:gd name="connsiteX4" fmla="*/ 0 w 3488602"/>
+              <a:gd name="connsiteY4" fmla="*/ 0 h 3433573"/>
+              <a:gd name="connsiteX0" fmla="*/ 0 w 3488602"/>
+              <a:gd name="connsiteY0" fmla="*/ 0 h 3433573"/>
+              <a:gd name="connsiteX1" fmla="*/ 3488602 w 3488602"/>
+              <a:gd name="connsiteY1" fmla="*/ 0 h 3433573"/>
+              <a:gd name="connsiteX2" fmla="*/ 0 w 3488602"/>
+              <a:gd name="connsiteY2" fmla="*/ 3433573 h 3433573"/>
+              <a:gd name="connsiteX3" fmla="*/ 0 w 3488602"/>
+              <a:gd name="connsiteY3" fmla="*/ 0 h 3433573"/>
+            </a:gdLst>
+            <a:ahLst/>
+            <a:cxnLst>
+              <a:cxn ang="0">
+                <a:pos x="connsiteX0" y="connsiteY0"/>
+              </a:cxn>
+              <a:cxn ang="0">
+                <a:pos x="connsiteX1" y="connsiteY1"/>
+              </a:cxn>
+              <a:cxn ang="0">
+                <a:pos x="connsiteX2" y="connsiteY2"/>
+              </a:cxn>
+              <a:cxn ang="0">
+                <a:pos x="connsiteX3" y="connsiteY3"/>
+              </a:cxn>
+            </a:cxnLst>
+            <a:rect l="l" t="t" r="r" b="b"/>
+            <a:pathLst>
+              <a:path w="3488602" h="3433573">
+                <a:moveTo>
+                  <a:pt x="0" y="0"/>
+                </a:moveTo>
+                <a:lnTo>
+                  <a:pt x="3488602" y="0"/>
+                </a:lnTo>
+                <a:lnTo>
+                  <a:pt x="0" y="3433573"/>
+                </a:lnTo>
+                <a:lnTo>
+                  <a:pt x="0" y="0"/>
+                </a:lnTo>
+                <a:close/>
+              </a:path>
+            </a:pathLst>
+          </a:custGeom>
           <a:solidFill>
             <a:schemeClr val="accent4">
               <a:lumMod val="40000"/>
@@ -6443,10 +6749,10 @@
       </p:sp>
       <p:sp>
         <p:nvSpPr>
-          <p:cNvPr id="26" name="Freeform: Shape 18">
-            <a:extLst>
-              <a:ext uri="{FF2B5EF4-FFF2-40B4-BE49-F238E27FC236}">
-                <a16:creationId xmlns:a16="http://schemas.microsoft.com/office/drawing/2014/main" id="{30F2F495-5DE2-4DF5-8741-3841A9DE41B3}"/>
+          <p:cNvPr id="21" name="Rectangle 20">
+            <a:extLst>
+              <a:ext uri="{FF2B5EF4-FFF2-40B4-BE49-F238E27FC236}">
+                <a16:creationId xmlns:a16="http://schemas.microsoft.com/office/drawing/2014/main" id="{CDDA81B4-3959-48A2-823E-19B014A03BA9}"/>
               </a:ext>
               <a:ext uri="{C183D7F6-B498-43B3-948B-1728B52AA6E4}">
                 <adec:decorative xmlns:adec="http://schemas.microsoft.com/office/drawing/2017/decorative" val="1"/>
@@ -6465,50 +6771,13 @@
           </p:nvPr>
         </p:nvSpPr>
         <p:spPr>
-          <a:xfrm rot="10800000" flipV="1">
-            <a:off x="8707925" y="3406925"/>
-            <a:ext cx="3485990" cy="3451076"/>
+          <a:xfrm rot="5400000">
+            <a:off x="6978388" y="1692178"/>
+            <a:ext cx="1724184" cy="1746020"/>
           </a:xfrm>
-          <a:custGeom>
+          <a:prstGeom prst="rect">
             <a:avLst/>
-            <a:gdLst>
-              <a:gd name="connsiteX0" fmla="*/ 0 w 2559050"/>
-              <a:gd name="connsiteY0" fmla="*/ 0 h 2559050"/>
-              <a:gd name="connsiteX1" fmla="*/ 2559050 w 2559050"/>
-              <a:gd name="connsiteY1" fmla="*/ 0 h 2559050"/>
-              <a:gd name="connsiteX2" fmla="*/ 0 w 2559050"/>
-              <a:gd name="connsiteY2" fmla="*/ 2559050 h 2559050"/>
-            </a:gdLst>
-            <a:ahLst/>
-            <a:cxnLst>
-              <a:cxn ang="0">
-                <a:pos x="connsiteX0" y="connsiteY0"/>
-              </a:cxn>
-              <a:cxn ang="0">
-                <a:pos x="connsiteX1" y="connsiteY1"/>
-              </a:cxn>
-              <a:cxn ang="0">
-                <a:pos x="connsiteX2" y="connsiteY2"/>
-              </a:cxn>
-            </a:cxnLst>
-            <a:rect l="l" t="t" r="r" b="b"/>
-            <a:pathLst>
-              <a:path w="2559050" h="2559050">
-                <a:moveTo>
-                  <a:pt x="0" y="0"/>
-                </a:moveTo>
-                <a:lnTo>
-                  <a:pt x="2559050" y="0"/>
-                </a:lnTo>
-                <a:cubicBezTo>
-                  <a:pt x="2559050" y="1413324"/>
-                  <a:pt x="1413324" y="2559050"/>
-                  <a:pt x="0" y="2559050"/>
-                </a:cubicBezTo>
-                <a:close/>
-              </a:path>
-            </a:pathLst>
-          </a:custGeom>
+          </a:prstGeom>
           <a:solidFill>
             <a:schemeClr val="accent5"/>
           </a:solidFill>
@@ -6533,6 +6802,127 @@
           </a:fontRef>
         </p:style>
         <p:txBody>
+          <a:bodyPr rtlCol="0" anchor="ctr"/>
+          <a:lstStyle/>
+          <a:p>
+            <a:pPr algn="ctr"/>
+            <a:endParaRPr lang="en-US" dirty="0"/>
+          </a:p>
+        </p:txBody>
+      </p:sp>
+      <p:sp>
+        <p:nvSpPr>
+          <p:cNvPr id="23" name="Freeform: Shape 22">
+            <a:extLst>
+              <a:ext uri="{FF2B5EF4-FFF2-40B4-BE49-F238E27FC236}">
+                <a16:creationId xmlns:a16="http://schemas.microsoft.com/office/drawing/2014/main" id="{5B8CC051-49B8-488A-B0AD-50A29E1D32E3}"/>
+              </a:ext>
+              <a:ext uri="{C183D7F6-B498-43B3-948B-1728B52AA6E4}">
+                <adec:decorative xmlns:adec="http://schemas.microsoft.com/office/drawing/2017/decorative" val="1"/>
+              </a:ext>
+            </a:extLst>
+          </p:cNvPr>
+          <p:cNvSpPr>
+            <a:spLocks noGrp="1" noRot="1" noChangeAspect="1" noMove="1" noResize="1" noEditPoints="1" noAdjustHandles="1" noChangeArrowheads="1" noChangeShapeType="1" noTextEdit="1"/>
+          </p:cNvSpPr>
+          <p:nvPr>
+            <p:extLst>
+              <p:ext uri="{386F3935-93C4-4BCD-93E2-E3B085C9AB24}">
+                <p16:designElem xmlns:p16="http://schemas.microsoft.com/office/powerpoint/2015/main" val="1"/>
+              </p:ext>
+            </p:extLst>
+          </p:nvPr>
+        </p:nvSpPr>
+        <p:spPr>
+          <a:xfrm rot="10800000" flipV="1">
+            <a:off x="6968949" y="1703064"/>
+            <a:ext cx="1744539" cy="862967"/>
+          </a:xfrm>
+          <a:custGeom>
+            <a:avLst/>
+            <a:gdLst>
+              <a:gd name="connsiteX0" fmla="*/ 3433574 w 3433574"/>
+              <a:gd name="connsiteY0" fmla="*/ 0 h 1716787"/>
+              <a:gd name="connsiteX1" fmla="*/ 1716787 w 3433574"/>
+              <a:gd name="connsiteY1" fmla="*/ 0 h 1716787"/>
+              <a:gd name="connsiteX2" fmla="*/ 0 w 3433574"/>
+              <a:gd name="connsiteY2" fmla="*/ 0 h 1716787"/>
+              <a:gd name="connsiteX3" fmla="*/ 1716787 w 3433574"/>
+              <a:gd name="connsiteY3" fmla="*/ 1716787 h 1716787"/>
+              <a:gd name="connsiteX4" fmla="*/ 3433574 w 3433574"/>
+              <a:gd name="connsiteY4" fmla="*/ 0 h 1716787"/>
+            </a:gdLst>
+            <a:ahLst/>
+            <a:cxnLst>
+              <a:cxn ang="0">
+                <a:pos x="connsiteX0" y="connsiteY0"/>
+              </a:cxn>
+              <a:cxn ang="0">
+                <a:pos x="connsiteX1" y="connsiteY1"/>
+              </a:cxn>
+              <a:cxn ang="0">
+                <a:pos x="connsiteX2" y="connsiteY2"/>
+              </a:cxn>
+              <a:cxn ang="0">
+                <a:pos x="connsiteX3" y="connsiteY3"/>
+              </a:cxn>
+              <a:cxn ang="0">
+                <a:pos x="connsiteX4" y="connsiteY4"/>
+              </a:cxn>
+            </a:cxnLst>
+            <a:rect l="l" t="t" r="r" b="b"/>
+            <a:pathLst>
+              <a:path w="3433574" h="1716787">
+                <a:moveTo>
+                  <a:pt x="3433574" y="0"/>
+                </a:moveTo>
+                <a:lnTo>
+                  <a:pt x="1716787" y="0"/>
+                </a:lnTo>
+                <a:lnTo>
+                  <a:pt x="0" y="0"/>
+                </a:lnTo>
+                <a:cubicBezTo>
+                  <a:pt x="0" y="948155"/>
+                  <a:pt x="768632" y="1716787"/>
+                  <a:pt x="1716787" y="1716787"/>
+                </a:cubicBezTo>
+                <a:cubicBezTo>
+                  <a:pt x="2664942" y="1716787"/>
+                  <a:pt x="3433574" y="948155"/>
+                  <a:pt x="3433574" y="0"/>
+                </a:cubicBezTo>
+                <a:close/>
+              </a:path>
+            </a:pathLst>
+          </a:custGeom>
+          <a:solidFill>
+            <a:schemeClr val="accent4">
+              <a:lumMod val="40000"/>
+              <a:lumOff val="60000"/>
+            </a:schemeClr>
+          </a:solidFill>
+          <a:ln>
+            <a:noFill/>
+          </a:ln>
+        </p:spPr>
+        <p:style>
+          <a:lnRef idx="2">
+            <a:schemeClr val="accent1">
+              <a:shade val="50000"/>
+            </a:schemeClr>
+          </a:lnRef>
+          <a:fillRef idx="1">
+            <a:schemeClr val="accent1"/>
+          </a:fillRef>
+          <a:effectRef idx="0">
+            <a:schemeClr val="accent1"/>
+          </a:effectRef>
+          <a:fontRef idx="minor">
+            <a:schemeClr val="lt1"/>
+          </a:fontRef>
+        </p:style>
+        <p:txBody>
           <a:bodyPr wrap="square" rtlCol="0" anchor="ctr">
             <a:noAutofit/>
           </a:bodyPr>
@@ -6549,10 +6939,10 @@
       </p:sp>
       <p:sp>
         <p:nvSpPr>
-          <p:cNvPr id="27" name="Rectangle 34">
-            <a:extLst>
-              <a:ext uri="{FF2B5EF4-FFF2-40B4-BE49-F238E27FC236}">
-                <a16:creationId xmlns:a16="http://schemas.microsoft.com/office/drawing/2014/main" id="{6A740D2F-CBAA-486B-B578-F35085ECE7DE}"/>
+          <p:cNvPr id="25" name="Freeform: Shape 24">
+            <a:extLst>
+              <a:ext uri="{FF2B5EF4-FFF2-40B4-BE49-F238E27FC236}">
+                <a16:creationId xmlns:a16="http://schemas.microsoft.com/office/drawing/2014/main" id="{A49FB65E-C02E-4FD7-B476-0B213C638B25}"/>
               </a:ext>
               <a:ext uri="{C183D7F6-B498-43B3-948B-1728B52AA6E4}">
                 <adec:decorative xmlns:adec="http://schemas.microsoft.com/office/drawing/2017/decorative" val="1"/>
@@ -6571,31 +6961,23 @@
           </p:nvPr>
         </p:nvSpPr>
         <p:spPr>
-          <a:xfrm rot="16200000">
-            <a:off x="8749175" y="-41251"/>
-            <a:ext cx="3417103" cy="3499599"/>
+          <a:xfrm rot="10800000" flipV="1">
+            <a:off x="6968949" y="2566032"/>
+            <a:ext cx="1744539" cy="862967"/>
           </a:xfrm>
           <a:custGeom>
             <a:avLst/>
             <a:gdLst>
-              <a:gd name="connsiteX0" fmla="*/ 0 w 3484819"/>
-              <a:gd name="connsiteY0" fmla="*/ 0 h 3430264"/>
-              <a:gd name="connsiteX1" fmla="*/ 3484819 w 3484819"/>
-              <a:gd name="connsiteY1" fmla="*/ 0 h 3430264"/>
-              <a:gd name="connsiteX2" fmla="*/ 3484819 w 3484819"/>
-              <a:gd name="connsiteY2" fmla="*/ 3430264 h 3430264"/>
-              <a:gd name="connsiteX3" fmla="*/ 0 w 3484819"/>
-              <a:gd name="connsiteY3" fmla="*/ 3430264 h 3430264"/>
-              <a:gd name="connsiteX4" fmla="*/ 0 w 3484819"/>
-              <a:gd name="connsiteY4" fmla="*/ 0 h 3430264"/>
-              <a:gd name="connsiteX0" fmla="*/ 0 w 3484819"/>
-              <a:gd name="connsiteY0" fmla="*/ 0 h 3430264"/>
-              <a:gd name="connsiteX1" fmla="*/ 3484819 w 3484819"/>
-              <a:gd name="connsiteY1" fmla="*/ 0 h 3430264"/>
-              <a:gd name="connsiteX2" fmla="*/ 0 w 3484819"/>
-              <a:gd name="connsiteY2" fmla="*/ 3430264 h 3430264"/>
-              <a:gd name="connsiteX3" fmla="*/ 0 w 3484819"/>
-              <a:gd name="connsiteY3" fmla="*/ 0 h 3430264"/>
+              <a:gd name="connsiteX0" fmla="*/ 3433574 w 3433574"/>
+              <a:gd name="connsiteY0" fmla="*/ 0 h 1716787"/>
+              <a:gd name="connsiteX1" fmla="*/ 1716787 w 3433574"/>
+              <a:gd name="connsiteY1" fmla="*/ 0 h 1716787"/>
+              <a:gd name="connsiteX2" fmla="*/ 0 w 3433574"/>
+              <a:gd name="connsiteY2" fmla="*/ 0 h 1716787"/>
+              <a:gd name="connsiteX3" fmla="*/ 1716787 w 3433574"/>
+              <a:gd name="connsiteY3" fmla="*/ 1716787 h 1716787"/>
+              <a:gd name="connsiteX4" fmla="*/ 3433574 w 3433574"/>
+              <a:gd name="connsiteY4" fmla="*/ 0 h 1716787"/>
             </a:gdLst>
             <a:ahLst/>
             <a:cxnLst>
@@ -6611,22 +6993,351 @@
               <a:cxn ang="0">
                 <a:pos x="connsiteX3" y="connsiteY3"/>
               </a:cxn>
+              <a:cxn ang="0">
+                <a:pos x="connsiteX4" y="connsiteY4"/>
+              </a:cxn>
             </a:cxnLst>
             <a:rect l="l" t="t" r="r" b="b"/>
             <a:pathLst>
-              <a:path w="3484819" h="3430264">
+              <a:path w="3433574" h="1716787">
                 <a:moveTo>
+                  <a:pt x="3433574" y="0"/>
+                </a:moveTo>
+                <a:lnTo>
+                  <a:pt x="1716787" y="0"/>
+                </a:lnTo>
+                <a:lnTo>
                   <a:pt x="0" y="0"/>
+                </a:lnTo>
+                <a:cubicBezTo>
+                  <a:pt x="0" y="948155"/>
+                  <a:pt x="768632" y="1716787"/>
+                  <a:pt x="1716787" y="1716787"/>
+                </a:cubicBezTo>
+                <a:cubicBezTo>
+                  <a:pt x="2664942" y="1716787"/>
+                  <a:pt x="3433574" y="948155"/>
+                  <a:pt x="3433574" y="0"/>
+                </a:cubicBezTo>
+                <a:close/>
+              </a:path>
+            </a:pathLst>
+          </a:custGeom>
+          <a:solidFill>
+            <a:schemeClr val="accent4">
+              <a:lumMod val="40000"/>
+              <a:lumOff val="60000"/>
+            </a:schemeClr>
+          </a:solidFill>
+          <a:ln>
+            <a:noFill/>
+          </a:ln>
+        </p:spPr>
+        <p:style>
+          <a:lnRef idx="2">
+            <a:schemeClr val="accent1">
+              <a:shade val="50000"/>
+            </a:schemeClr>
+          </a:lnRef>
+          <a:fillRef idx="1">
+            <a:schemeClr val="accent1"/>
+          </a:fillRef>
+          <a:effectRef idx="0">
+            <a:schemeClr val="accent1"/>
+          </a:effectRef>
+          <a:fontRef idx="minor">
+            <a:schemeClr val="lt1"/>
+          </a:fontRef>
+        </p:style>
+        <p:txBody>
+          <a:bodyPr wrap="square" rtlCol="0" anchor="ctr">
+            <a:noAutofit/>
+          </a:bodyPr>
+          <a:lstStyle/>
+          <a:p>
+            <a:pPr algn="ctr"/>
+            <a:endParaRPr lang="en-US">
+              <a:solidFill>
+                <a:schemeClr val="tx1"/>
+              </a:solidFill>
+            </a:endParaRPr>
+          </a:p>
+        </p:txBody>
+      </p:sp>
+      <p:sp>
+        <p:nvSpPr>
+          <p:cNvPr id="27" name="Rectangle 26">
+            <a:extLst>
+              <a:ext uri="{FF2B5EF4-FFF2-40B4-BE49-F238E27FC236}">
+                <a16:creationId xmlns:a16="http://schemas.microsoft.com/office/drawing/2014/main" id="{FB7EBD78-005D-4F93-BEA0-95DF292B3827}"/>
+              </a:ext>
+              <a:ext uri="{C183D7F6-B498-43B3-948B-1728B52AA6E4}">
+                <adec:decorative xmlns:adec="http://schemas.microsoft.com/office/drawing/2017/decorative" val="1"/>
+              </a:ext>
+            </a:extLst>
+          </p:cNvPr>
+          <p:cNvSpPr>
+            <a:spLocks noGrp="1" noRot="1" noChangeAspect="1" noMove="1" noResize="1" noEditPoints="1" noAdjustHandles="1" noChangeArrowheads="1" noChangeShapeType="1" noTextEdit="1"/>
+          </p:cNvSpPr>
+          <p:nvPr>
+            <p:extLst>
+              <p:ext uri="{386F3935-93C4-4BCD-93E2-E3B085C9AB24}">
+                <p16:designElem xmlns:p16="http://schemas.microsoft.com/office/powerpoint/2015/main" val="1"/>
+              </p:ext>
+            </p:extLst>
+          </p:nvPr>
+        </p:nvSpPr>
+        <p:spPr>
+          <a:xfrm rot="5400000">
+            <a:off x="8738250" y="-24765"/>
+            <a:ext cx="3427285" cy="3476805"/>
+          </a:xfrm>
+          <a:prstGeom prst="rect">
+            <a:avLst/>
+          </a:prstGeom>
+          <a:solidFill>
+            <a:schemeClr val="accent1">
+              <a:lumMod val="60000"/>
+              <a:lumOff val="40000"/>
+            </a:schemeClr>
+          </a:solidFill>
+          <a:ln>
+            <a:noFill/>
+          </a:ln>
+        </p:spPr>
+        <p:style>
+          <a:lnRef idx="2">
+            <a:schemeClr val="accent1">
+              <a:shade val="50000"/>
+            </a:schemeClr>
+          </a:lnRef>
+          <a:fillRef idx="1">
+            <a:schemeClr val="accent1"/>
+          </a:fillRef>
+          <a:effectRef idx="0">
+            <a:schemeClr val="accent1"/>
+          </a:effectRef>
+          <a:fontRef idx="minor">
+            <a:schemeClr val="lt1"/>
+          </a:fontRef>
+        </p:style>
+        <p:txBody>
+          <a:bodyPr rtlCol="0" anchor="ctr"/>
+          <a:lstStyle/>
+          <a:p>
+            <a:pPr algn="ctr"/>
+            <a:endParaRPr lang="en-US" dirty="0"/>
+          </a:p>
+        </p:txBody>
+      </p:sp>
+      <p:sp>
+        <p:nvSpPr>
+          <p:cNvPr id="29" name="Oval 28">
+            <a:extLst>
+              <a:ext uri="{FF2B5EF4-FFF2-40B4-BE49-F238E27FC236}">
+                <a16:creationId xmlns:a16="http://schemas.microsoft.com/office/drawing/2014/main" id="{8CB81301-287D-4882-AD9B-E44D8E122095}"/>
+              </a:ext>
+              <a:ext uri="{C183D7F6-B498-43B3-948B-1728B52AA6E4}">
+                <adec:decorative xmlns:adec="http://schemas.microsoft.com/office/drawing/2017/decorative" val="1"/>
+              </a:ext>
+            </a:extLst>
+          </p:cNvPr>
+          <p:cNvSpPr>
+            <a:spLocks noGrp="1" noRot="1" noChangeAspect="1" noMove="1" noResize="1" noEditPoints="1" noAdjustHandles="1" noChangeArrowheads="1" noChangeShapeType="1" noTextEdit="1"/>
+          </p:cNvSpPr>
+          <p:nvPr>
+            <p:extLst>
+              <p:ext uri="{386F3935-93C4-4BCD-93E2-E3B085C9AB24}">
+                <p16:designElem xmlns:p16="http://schemas.microsoft.com/office/powerpoint/2015/main" val="1"/>
+              </p:ext>
+            </p:extLst>
+          </p:nvPr>
+        </p:nvSpPr>
+        <p:spPr>
+          <a:xfrm>
+            <a:off x="8914500" y="178410"/>
+            <a:ext cx="3070455" cy="3070455"/>
+          </a:xfrm>
+          <a:prstGeom prst="ellipse">
+            <a:avLst/>
+          </a:prstGeom>
+          <a:solidFill>
+            <a:schemeClr val="accent2"/>
+          </a:solidFill>
+          <a:ln>
+            <a:noFill/>
+          </a:ln>
+        </p:spPr>
+        <p:style>
+          <a:lnRef idx="2">
+            <a:schemeClr val="accent1">
+              <a:shade val="50000"/>
+            </a:schemeClr>
+          </a:lnRef>
+          <a:fillRef idx="1">
+            <a:schemeClr val="accent1"/>
+          </a:fillRef>
+          <a:effectRef idx="0">
+            <a:schemeClr val="accent1"/>
+          </a:effectRef>
+          <a:fontRef idx="minor">
+            <a:schemeClr val="lt1"/>
+          </a:fontRef>
+        </p:style>
+        <p:txBody>
+          <a:bodyPr rtlCol="0" anchor="ctr"/>
+          <a:lstStyle/>
+          <a:p>
+            <a:pPr algn="ctr"/>
+            <a:endParaRPr lang="en-US"/>
+          </a:p>
+        </p:txBody>
+      </p:sp>
+      <p:sp>
+        <p:nvSpPr>
+          <p:cNvPr id="31" name="Rectangle 30">
+            <a:extLst>
+              <a:ext uri="{FF2B5EF4-FFF2-40B4-BE49-F238E27FC236}">
+                <a16:creationId xmlns:a16="http://schemas.microsoft.com/office/drawing/2014/main" id="{1122F9F7-A178-468E-AF59-8DD67246E43A}"/>
+              </a:ext>
+              <a:ext uri="{C183D7F6-B498-43B3-948B-1728B52AA6E4}">
+                <adec:decorative xmlns:adec="http://schemas.microsoft.com/office/drawing/2017/decorative" val="1"/>
+              </a:ext>
+            </a:extLst>
+          </p:cNvPr>
+          <p:cNvSpPr>
+            <a:spLocks noGrp="1" noRot="1" noChangeAspect="1" noMove="1" noResize="1" noEditPoints="1" noAdjustHandles="1" noChangeArrowheads="1" noChangeShapeType="1" noTextEdit="1"/>
+          </p:cNvSpPr>
+          <p:nvPr>
+            <p:extLst>
+              <p:ext uri="{386F3935-93C4-4BCD-93E2-E3B085C9AB24}">
+                <p16:designElem xmlns:p16="http://schemas.microsoft.com/office/powerpoint/2015/main" val="1"/>
+              </p:ext>
+            </p:extLst>
+          </p:nvPr>
+        </p:nvSpPr>
+        <p:spPr>
+          <a:xfrm rot="5400000">
+            <a:off x="6122799" y="4271951"/>
+            <a:ext cx="3435362" cy="1746020"/>
+          </a:xfrm>
+          <a:prstGeom prst="rect">
+            <a:avLst/>
+          </a:prstGeom>
+          <a:solidFill>
+            <a:schemeClr val="accent2"/>
+          </a:solidFill>
+          <a:ln>
+            <a:noFill/>
+          </a:ln>
+        </p:spPr>
+        <p:style>
+          <a:lnRef idx="2">
+            <a:schemeClr val="accent1">
+              <a:shade val="50000"/>
+            </a:schemeClr>
+          </a:lnRef>
+          <a:fillRef idx="1">
+            <a:schemeClr val="accent1"/>
+          </a:fillRef>
+          <a:effectRef idx="0">
+            <a:schemeClr val="accent1"/>
+          </a:effectRef>
+          <a:fontRef idx="minor">
+            <a:schemeClr val="lt1"/>
+          </a:fontRef>
+        </p:style>
+        <p:txBody>
+          <a:bodyPr rtlCol="0" anchor="ctr"/>
+          <a:lstStyle/>
+          <a:p>
+            <a:pPr algn="ctr"/>
+            <a:endParaRPr lang="en-US" dirty="0"/>
+          </a:p>
+        </p:txBody>
+      </p:sp>
+      <p:sp>
+        <p:nvSpPr>
+          <p:cNvPr id="33" name="Freeform: Shape 32">
+            <a:extLst>
+              <a:ext uri="{FF2B5EF4-FFF2-40B4-BE49-F238E27FC236}">
+                <a16:creationId xmlns:a16="http://schemas.microsoft.com/office/drawing/2014/main" id="{76420B0A-CC71-4BD3-BA69-E9B2B6F1E57A}"/>
+              </a:ext>
+              <a:ext uri="{C183D7F6-B498-43B3-948B-1728B52AA6E4}">
+                <adec:decorative xmlns:adec="http://schemas.microsoft.com/office/drawing/2017/decorative" val="1"/>
+              </a:ext>
+            </a:extLst>
+          </p:cNvPr>
+          <p:cNvSpPr>
+            <a:spLocks noGrp="1" noRot="1" noChangeAspect="1" noMove="1" noResize="1" noEditPoints="1" noAdjustHandles="1" noChangeArrowheads="1" noChangeShapeType="1" noTextEdit="1"/>
+          </p:cNvSpPr>
+          <p:nvPr>
+            <p:extLst>
+              <p:ext uri="{386F3935-93C4-4BCD-93E2-E3B085C9AB24}">
+                <p16:designElem xmlns:p16="http://schemas.microsoft.com/office/powerpoint/2015/main" val="1"/>
+              </p:ext>
+            </p:extLst>
+          </p:nvPr>
+        </p:nvSpPr>
+        <p:spPr>
+          <a:xfrm rot="5400000" flipV="1">
+            <a:off x="6122814" y="4271933"/>
+            <a:ext cx="3435331" cy="1746022"/>
+          </a:xfrm>
+          <a:custGeom>
+            <a:avLst/>
+            <a:gdLst>
+              <a:gd name="connsiteX0" fmla="*/ 3433574 w 3433574"/>
+              <a:gd name="connsiteY0" fmla="*/ 0 h 1716787"/>
+              <a:gd name="connsiteX1" fmla="*/ 1716787 w 3433574"/>
+              <a:gd name="connsiteY1" fmla="*/ 0 h 1716787"/>
+              <a:gd name="connsiteX2" fmla="*/ 0 w 3433574"/>
+              <a:gd name="connsiteY2" fmla="*/ 0 h 1716787"/>
+              <a:gd name="connsiteX3" fmla="*/ 1716787 w 3433574"/>
+              <a:gd name="connsiteY3" fmla="*/ 1716787 h 1716787"/>
+              <a:gd name="connsiteX4" fmla="*/ 3433574 w 3433574"/>
+              <a:gd name="connsiteY4" fmla="*/ 0 h 1716787"/>
+            </a:gdLst>
+            <a:ahLst/>
+            <a:cxnLst>
+              <a:cxn ang="0">
+                <a:pos x="connsiteX0" y="connsiteY0"/>
+              </a:cxn>
+              <a:cxn ang="0">
+                <a:pos x="connsiteX1" y="connsiteY1"/>
+              </a:cxn>
+              <a:cxn ang="0">
+                <a:pos x="connsiteX2" y="connsiteY2"/>
+              </a:cxn>
+              <a:cxn ang="0">
+                <a:pos x="connsiteX3" y="connsiteY3"/>
+              </a:cxn>
+              <a:cxn ang="0">
+                <a:pos x="connsiteX4" y="connsiteY4"/>
+              </a:cxn>
+            </a:cxnLst>
+            <a:rect l="l" t="t" r="r" b="b"/>
+            <a:pathLst>
+              <a:path w="3433574" h="1716787">
+                <a:moveTo>
+                  <a:pt x="3433574" y="0"/>
                 </a:moveTo>
                 <a:lnTo>
-                  <a:pt x="3484819" y="0"/>
-                </a:lnTo>
-                <a:lnTo>
-                  <a:pt x="0" y="3430264"/>
+                  <a:pt x="1716787" y="0"/>
                 </a:lnTo>
                 <a:lnTo>
                   <a:pt x="0" y="0"/>
                 </a:lnTo>
+                <a:cubicBezTo>
+                  <a:pt x="0" y="948155"/>
+                  <a:pt x="768632" y="1716787"/>
+                  <a:pt x="1716787" y="1716787"/>
+                </a:cubicBezTo>
+                <a:cubicBezTo>
+                  <a:pt x="2664942" y="1716787"/>
+                  <a:pt x="3433574" y="948155"/>
+                  <a:pt x="3433574" y="0"/>
+                </a:cubicBezTo>
                 <a:close/>
               </a:path>
             </a:pathLst>
@@ -6658,6 +7369,191 @@
           </a:fontRef>
         </p:style>
         <p:txBody>
+          <a:bodyPr wrap="square" rtlCol="0" anchor="ctr">
+            <a:noAutofit/>
+          </a:bodyPr>
+          <a:lstStyle/>
+          <a:p>
+            <a:pPr algn="ctr"/>
+            <a:endParaRPr lang="en-US" dirty="0">
+              <a:solidFill>
+                <a:schemeClr val="tx1"/>
+              </a:solidFill>
+            </a:endParaRPr>
+          </a:p>
+        </p:txBody>
+      </p:sp>
+      <p:sp>
+        <p:nvSpPr>
+          <p:cNvPr id="35" name="Rectangle 34">
+            <a:extLst>
+              <a:ext uri="{FF2B5EF4-FFF2-40B4-BE49-F238E27FC236}">
+                <a16:creationId xmlns:a16="http://schemas.microsoft.com/office/drawing/2014/main" id="{E5048351-EA66-4465-9CB8-25B4C5E6800F}"/>
+              </a:ext>
+              <a:ext uri="{C183D7F6-B498-43B3-948B-1728B52AA6E4}">
+                <adec:decorative xmlns:adec="http://schemas.microsoft.com/office/drawing/2017/decorative" val="1"/>
+              </a:ext>
+            </a:extLst>
+          </p:cNvPr>
+          <p:cNvSpPr>
+            <a:spLocks noGrp="1" noRot="1" noChangeAspect="1" noMove="1" noResize="1" noEditPoints="1" noAdjustHandles="1" noChangeArrowheads="1" noChangeShapeType="1" noTextEdit="1"/>
+          </p:cNvSpPr>
+          <p:nvPr>
+            <p:extLst>
+              <p:ext uri="{386F3935-93C4-4BCD-93E2-E3B085C9AB24}">
+                <p16:designElem xmlns:p16="http://schemas.microsoft.com/office/powerpoint/2015/main" val="1"/>
+              </p:ext>
+            </p:extLst>
+          </p:nvPr>
+        </p:nvSpPr>
+        <p:spPr>
+          <a:xfrm rot="5400000">
+            <a:off x="8734228" y="3406574"/>
+            <a:ext cx="3435330" cy="3476805"/>
+          </a:xfrm>
+          <a:prstGeom prst="rect">
+            <a:avLst/>
+          </a:prstGeom>
+          <a:solidFill>
+            <a:schemeClr val="accent5"/>
+          </a:solidFill>
+          <a:ln>
+            <a:noFill/>
+          </a:ln>
+        </p:spPr>
+        <p:style>
+          <a:lnRef idx="2">
+            <a:schemeClr val="accent1">
+              <a:shade val="50000"/>
+            </a:schemeClr>
+          </a:lnRef>
+          <a:fillRef idx="1">
+            <a:schemeClr val="accent1"/>
+          </a:fillRef>
+          <a:effectRef idx="0">
+            <a:schemeClr val="accent1"/>
+          </a:effectRef>
+          <a:fontRef idx="minor">
+            <a:schemeClr val="lt1"/>
+          </a:fontRef>
+        </p:style>
+        <p:txBody>
+          <a:bodyPr rtlCol="0" anchor="ctr"/>
+          <a:lstStyle/>
+          <a:p>
+            <a:pPr algn="ctr"/>
+            <a:endParaRPr lang="en-US" dirty="0"/>
+          </a:p>
+        </p:txBody>
+      </p:sp>
+      <p:sp>
+        <p:nvSpPr>
+          <p:cNvPr id="37" name="Rectangle 3">
+            <a:extLst>
+              <a:ext uri="{FF2B5EF4-FFF2-40B4-BE49-F238E27FC236}">
+                <a16:creationId xmlns:a16="http://schemas.microsoft.com/office/drawing/2014/main" id="{BC467846-2355-4572-AC5B-89B9FFFBAA70}"/>
+              </a:ext>
+              <a:ext uri="{C183D7F6-B498-43B3-948B-1728B52AA6E4}">
+                <adec:decorative xmlns:adec="http://schemas.microsoft.com/office/drawing/2017/decorative" val="1"/>
+              </a:ext>
+            </a:extLst>
+          </p:cNvPr>
+          <p:cNvSpPr>
+            <a:spLocks noGrp="1" noRot="1" noChangeAspect="1" noMove="1" noResize="1" noEditPoints="1" noAdjustHandles="1" noChangeArrowheads="1" noChangeShapeType="1" noTextEdit="1"/>
+          </p:cNvSpPr>
+          <p:nvPr>
+            <p:extLst>
+              <p:ext uri="{386F3935-93C4-4BCD-93E2-E3B085C9AB24}">
+                <p16:designElem xmlns:p16="http://schemas.microsoft.com/office/powerpoint/2015/main" val="1"/>
+              </p:ext>
+            </p:extLst>
+          </p:nvPr>
+        </p:nvSpPr>
+        <p:spPr>
+          <a:xfrm rot="10800000">
+            <a:off x="8707457" y="3427799"/>
+            <a:ext cx="3484541" cy="3434283"/>
+          </a:xfrm>
+          <a:custGeom>
+            <a:avLst/>
+            <a:gdLst>
+              <a:gd name="connsiteX0" fmla="*/ 0 w 3488602"/>
+              <a:gd name="connsiteY0" fmla="*/ 0 h 3433573"/>
+              <a:gd name="connsiteX1" fmla="*/ 3488602 w 3488602"/>
+              <a:gd name="connsiteY1" fmla="*/ 0 h 3433573"/>
+              <a:gd name="connsiteX2" fmla="*/ 3488602 w 3488602"/>
+              <a:gd name="connsiteY2" fmla="*/ 3433573 h 3433573"/>
+              <a:gd name="connsiteX3" fmla="*/ 0 w 3488602"/>
+              <a:gd name="connsiteY3" fmla="*/ 3433573 h 3433573"/>
+              <a:gd name="connsiteX4" fmla="*/ 0 w 3488602"/>
+              <a:gd name="connsiteY4" fmla="*/ 0 h 3433573"/>
+              <a:gd name="connsiteX0" fmla="*/ 0 w 3488602"/>
+              <a:gd name="connsiteY0" fmla="*/ 0 h 3433573"/>
+              <a:gd name="connsiteX1" fmla="*/ 3488602 w 3488602"/>
+              <a:gd name="connsiteY1" fmla="*/ 0 h 3433573"/>
+              <a:gd name="connsiteX2" fmla="*/ 0 w 3488602"/>
+              <a:gd name="connsiteY2" fmla="*/ 3433573 h 3433573"/>
+              <a:gd name="connsiteX3" fmla="*/ 0 w 3488602"/>
+              <a:gd name="connsiteY3" fmla="*/ 0 h 3433573"/>
+            </a:gdLst>
+            <a:ahLst/>
+            <a:cxnLst>
+              <a:cxn ang="0">
+                <a:pos x="connsiteX0" y="connsiteY0"/>
+              </a:cxn>
+              <a:cxn ang="0">
+                <a:pos x="connsiteX1" y="connsiteY1"/>
+              </a:cxn>
+              <a:cxn ang="0">
+                <a:pos x="connsiteX2" y="connsiteY2"/>
+              </a:cxn>
+              <a:cxn ang="0">
+                <a:pos x="connsiteX3" y="connsiteY3"/>
+              </a:cxn>
+            </a:cxnLst>
+            <a:rect l="l" t="t" r="r" b="b"/>
+            <a:pathLst>
+              <a:path w="3488602" h="3433573">
+                <a:moveTo>
+                  <a:pt x="0" y="0"/>
+                </a:moveTo>
+                <a:lnTo>
+                  <a:pt x="3488602" y="0"/>
+                </a:lnTo>
+                <a:lnTo>
+                  <a:pt x="0" y="3433573"/>
+                </a:lnTo>
+                <a:lnTo>
+                  <a:pt x="0" y="0"/>
+                </a:lnTo>
+                <a:close/>
+              </a:path>
+            </a:pathLst>
+          </a:custGeom>
+          <a:solidFill>
+            <a:schemeClr val="tx2"/>
+          </a:solidFill>
+          <a:ln>
+            <a:noFill/>
+          </a:ln>
+        </p:spPr>
+        <p:style>
+          <a:lnRef idx="2">
+            <a:schemeClr val="accent1">
+              <a:shade val="50000"/>
+            </a:schemeClr>
+          </a:lnRef>
+          <a:fillRef idx="1">
+            <a:schemeClr val="accent1"/>
+          </a:fillRef>
+          <a:effectRef idx="0">
+            <a:schemeClr val="accent1"/>
+          </a:effectRef>
+          <a:fontRef idx="minor">
+            <a:schemeClr val="lt1"/>
+          </a:fontRef>
+        </p:style>
+        <p:txBody>
           <a:bodyPr rtlCol="0" anchor="ctr"/>
           <a:lstStyle/>
           <a:p>
@@ -6669,7 +7565,7 @@
     </p:spTree>
     <p:extLst>
       <p:ext uri="{BB962C8B-B14F-4D97-AF65-F5344CB8AC3E}">
-        <p14:creationId xmlns:p14="http://schemas.microsoft.com/office/powerpoint/2010/main" val="1066473347"/>
+        <p14:creationId xmlns:p14="http://schemas.microsoft.com/office/powerpoint/2010/main" val="3617839981"/>
       </p:ext>
     </p:extLst>
   </p:cSld>
@@ -6679,7 +7575,112 @@
 </p:sld>
 </file>
 
-<file path=ppt/slides/slide16.xml><?xml version="1.0" encoding="utf-8"?>
+<file path=ppt/slides/slide2.xml><?xml version="1.0" encoding="utf-8"?>
+<p:sld xmlns:a="http://schemas.openxmlformats.org/drawingml/2006/main" xmlns:r="http://schemas.openxmlformats.org/officeDocument/2006/relationships" xmlns:p="http://schemas.openxmlformats.org/presentationml/2006/main">
+  <p:cSld>
+    <p:spTree>
+      <p:nvGrpSpPr>
+        <p:cNvPr id="1" name=""/>
+        <p:cNvGrpSpPr/>
+        <p:nvPr/>
+      </p:nvGrpSpPr>
+      <p:grpSpPr>
+        <a:xfrm>
+          <a:off x="0" y="0"/>
+          <a:ext cx="0" cy="0"/>
+          <a:chOff x="0" y="0"/>
+          <a:chExt cx="0" cy="0"/>
+        </a:xfrm>
+      </p:grpSpPr>
+      <p:sp>
+        <p:nvSpPr>
+          <p:cNvPr id="2" name="Title 1">
+            <a:extLst>
+              <a:ext uri="{FF2B5EF4-FFF2-40B4-BE49-F238E27FC236}">
+                <a16:creationId xmlns:a16="http://schemas.microsoft.com/office/drawing/2014/main" id="{36AC8F55-4D5A-47D8-A529-733798879A45}"/>
+              </a:ext>
+            </a:extLst>
+          </p:cNvPr>
+          <p:cNvSpPr>
+            <a:spLocks noGrp="1"/>
+          </p:cNvSpPr>
+          <p:nvPr>
+            <p:ph type="title"/>
+          </p:nvPr>
+        </p:nvSpPr>
+        <p:spPr/>
+        <p:txBody>
+          <a:bodyPr/>
+          <a:lstStyle/>
+          <a:p>
+            <a:pPr algn="ctr"/>
+            <a:r>
+              <a:rPr lang="en-US"/>
+              <a:t>Introduction</a:t>
+            </a:r>
+          </a:p>
+        </p:txBody>
+      </p:sp>
+      <p:sp>
+        <p:nvSpPr>
+          <p:cNvPr id="3" name="Content Placeholder 2">
+            <a:extLst>
+              <a:ext uri="{FF2B5EF4-FFF2-40B4-BE49-F238E27FC236}">
+                <a16:creationId xmlns:a16="http://schemas.microsoft.com/office/drawing/2014/main" id="{72A9E4C4-57CC-48E9-8D4F-E18257873CA8}"/>
+              </a:ext>
+            </a:extLst>
+          </p:cNvPr>
+          <p:cNvSpPr>
+            <a:spLocks noGrp="1"/>
+          </p:cNvSpPr>
+          <p:nvPr>
+            <p:ph idx="1"/>
+          </p:nvPr>
+        </p:nvSpPr>
+        <p:spPr/>
+        <p:txBody>
+          <a:bodyPr/>
+          <a:lstStyle/>
+          <a:p>
+            <a:r>
+              <a:rPr lang="en-US" dirty="0"/>
+              <a:t>You’ll have to scan a port sooner or later in Cyber</a:t>
+            </a:r>
+          </a:p>
+          <a:p>
+            <a:r>
+              <a:rPr lang="en-US" dirty="0"/>
+              <a:t>All it takes is that one vulnerable service</a:t>
+            </a:r>
+          </a:p>
+          <a:p>
+            <a:r>
+              <a:rPr lang="en-US" dirty="0"/>
+              <a:t>Sometimes even you don’t know what ports are open on your system</a:t>
+            </a:r>
+          </a:p>
+          <a:p>
+            <a:r>
+              <a:rPr lang="en-US" dirty="0"/>
+              <a:t>It’s a waste of time and resources to manually verify all outward-facing services and open ports</a:t>
+            </a:r>
+          </a:p>
+        </p:txBody>
+      </p:sp>
+    </p:spTree>
+    <p:extLst>
+      <p:ext uri="{BB962C8B-B14F-4D97-AF65-F5344CB8AC3E}">
+        <p14:creationId xmlns:p14="http://schemas.microsoft.com/office/powerpoint/2010/main" val="3955383912"/>
+      </p:ext>
+    </p:extLst>
+  </p:cSld>
+  <p:clrMapOvr>
+    <a:masterClrMapping/>
+  </p:clrMapOvr>
+</p:sld>
+</file>
+
+<file path=ppt/slides/slide3.xml><?xml version="1.0" encoding="utf-8"?>
 <p:sld xmlns:a="http://schemas.openxmlformats.org/drawingml/2006/main" xmlns:r="http://schemas.openxmlformats.org/officeDocument/2006/relationships" xmlns:p="http://schemas.openxmlformats.org/presentationml/2006/main">
   <p:cSld>
     <p:bg>
@@ -6706,7 +7707,7 @@
       </p:grpSpPr>
       <p:sp>
         <p:nvSpPr>
-          <p:cNvPr id="9" name="Freeform: Shape 8">
+          <p:cNvPr id="11" name="Freeform: Shape 10">
             <a:extLst>
               <a:ext uri="{FF2B5EF4-FFF2-40B4-BE49-F238E27FC236}">
                 <a16:creationId xmlns:a16="http://schemas.microsoft.com/office/drawing/2014/main" id="{AE192E3E-68A9-4F36-936C-1C8D0B9EF132}"/>
@@ -6832,10 +7833,10 @@
       </p:sp>
       <p:sp useBgFill="1">
         <p:nvSpPr>
-          <p:cNvPr id="11" name="Rectangle 10">
-            <a:extLst>
-              <a:ext uri="{FF2B5EF4-FFF2-40B4-BE49-F238E27FC236}">
-                <a16:creationId xmlns:a16="http://schemas.microsoft.com/office/drawing/2014/main" id="{5FDBEA07-A1D3-4F9E-859B-DE0EDC864095}"/>
+          <p:cNvPr id="13" name="Rectangle 12">
+            <a:extLst>
+              <a:ext uri="{FF2B5EF4-FFF2-40B4-BE49-F238E27FC236}">
+                <a16:creationId xmlns:a16="http://schemas.microsoft.com/office/drawing/2014/main" id="{DA1766D0-745A-4921-A68E-56642A6508CF}"/>
               </a:ext>
               <a:ext uri="{C183D7F6-B498-43B3-948B-1728B52AA6E4}">
                 <adec:decorative xmlns:adec="http://schemas.microsoft.com/office/drawing/2017/decorative" val="1"/>
@@ -6908,1553 +7909,6 @@
       </p:sp>
       <p:sp>
         <p:nvSpPr>
-          <p:cNvPr id="13" name="Rectangle 12">
-            <a:extLst>
-              <a:ext uri="{FF2B5EF4-FFF2-40B4-BE49-F238E27FC236}">
-                <a16:creationId xmlns:a16="http://schemas.microsoft.com/office/drawing/2014/main" id="{53E87B83-CF96-4EE7-950F-863990226F53}"/>
-              </a:ext>
-              <a:ext uri="{C183D7F6-B498-43B3-948B-1728B52AA6E4}">
-                <adec:decorative xmlns:adec="http://schemas.microsoft.com/office/drawing/2017/decorative" val="1"/>
-              </a:ext>
-            </a:extLst>
-          </p:cNvPr>
-          <p:cNvSpPr>
-            <a:spLocks noGrp="1" noRot="1" noChangeAspect="1" noMove="1" noResize="1" noEditPoints="1" noAdjustHandles="1" noChangeArrowheads="1" noChangeShapeType="1" noTextEdit="1"/>
-          </p:cNvSpPr>
-          <p:nvPr>
-            <p:extLst>
-              <p:ext uri="{386F3935-93C4-4BCD-93E2-E3B085C9AB24}">
-                <p16:designElem xmlns:p16="http://schemas.microsoft.com/office/powerpoint/2015/main" val="1"/>
-              </p:ext>
-            </p:extLst>
-          </p:nvPr>
-        </p:nvSpPr>
-        <p:spPr>
-          <a:xfrm rot="5400000">
-            <a:off x="53658" y="-55810"/>
-            <a:ext cx="6859721" cy="6967904"/>
-          </a:xfrm>
-          <a:prstGeom prst="rect">
-            <a:avLst/>
-          </a:prstGeom>
-          <a:solidFill>
-            <a:schemeClr val="tx2"/>
-          </a:solidFill>
-          <a:ln>
-            <a:noFill/>
-          </a:ln>
-        </p:spPr>
-        <p:style>
-          <a:lnRef idx="2">
-            <a:schemeClr val="accent1">
-              <a:shade val="50000"/>
-            </a:schemeClr>
-          </a:lnRef>
-          <a:fillRef idx="1">
-            <a:schemeClr val="accent1"/>
-          </a:fillRef>
-          <a:effectRef idx="0">
-            <a:schemeClr val="accent1"/>
-          </a:effectRef>
-          <a:fontRef idx="minor">
-            <a:schemeClr val="lt1"/>
-          </a:fontRef>
-        </p:style>
-        <p:txBody>
-          <a:bodyPr rtlCol="0" anchor="ctr"/>
-          <a:lstStyle/>
-          <a:p>
-            <a:pPr algn="ctr"/>
-            <a:endParaRPr lang="en-US" dirty="0"/>
-          </a:p>
-        </p:txBody>
-      </p:sp>
-      <p:sp useBgFill="1">
-        <p:nvSpPr>
-          <p:cNvPr id="15" name="Freeform: Shape 14">
-            <a:extLst>
-              <a:ext uri="{FF2B5EF4-FFF2-40B4-BE49-F238E27FC236}">
-                <a16:creationId xmlns:a16="http://schemas.microsoft.com/office/drawing/2014/main" id="{407ADFB6-F59B-415B-9EC6-BDB61786C475}"/>
-              </a:ext>
-              <a:ext uri="{C183D7F6-B498-43B3-948B-1728B52AA6E4}">
-                <adec:decorative xmlns:adec="http://schemas.microsoft.com/office/drawing/2017/decorative" val="1"/>
-              </a:ext>
-            </a:extLst>
-          </p:cNvPr>
-          <p:cNvSpPr>
-            <a:spLocks noGrp="1" noRot="1" noChangeAspect="1" noMove="1" noResize="1" noEditPoints="1" noAdjustHandles="1" noChangeArrowheads="1" noChangeShapeType="1" noTextEdit="1"/>
-          </p:cNvSpPr>
-          <p:nvPr>
-            <p:extLst>
-              <p:ext uri="{386F3935-93C4-4BCD-93E2-E3B085C9AB24}">
-                <p16:designElem xmlns:p16="http://schemas.microsoft.com/office/powerpoint/2015/main" val="1"/>
-              </p:ext>
-            </p:extLst>
-          </p:nvPr>
-        </p:nvSpPr>
-        <p:spPr>
-          <a:xfrm rot="5400000" flipH="1" flipV="1">
-            <a:off x="54516" y="-50314"/>
-            <a:ext cx="6858005" cy="6967903"/>
-          </a:xfrm>
-          <a:custGeom>
-            <a:avLst/>
-            <a:gdLst>
-              <a:gd name="connsiteX0" fmla="*/ 0 w 2559050"/>
-              <a:gd name="connsiteY0" fmla="*/ 0 h 2559050"/>
-              <a:gd name="connsiteX1" fmla="*/ 2559050 w 2559050"/>
-              <a:gd name="connsiteY1" fmla="*/ 0 h 2559050"/>
-              <a:gd name="connsiteX2" fmla="*/ 0 w 2559050"/>
-              <a:gd name="connsiteY2" fmla="*/ 2559050 h 2559050"/>
-            </a:gdLst>
-            <a:ahLst/>
-            <a:cxnLst>
-              <a:cxn ang="0">
-                <a:pos x="connsiteX0" y="connsiteY0"/>
-              </a:cxn>
-              <a:cxn ang="0">
-                <a:pos x="connsiteX1" y="connsiteY1"/>
-              </a:cxn>
-              <a:cxn ang="0">
-                <a:pos x="connsiteX2" y="connsiteY2"/>
-              </a:cxn>
-            </a:cxnLst>
-            <a:rect l="l" t="t" r="r" b="b"/>
-            <a:pathLst>
-              <a:path w="2559050" h="2559050">
-                <a:moveTo>
-                  <a:pt x="0" y="0"/>
-                </a:moveTo>
-                <a:lnTo>
-                  <a:pt x="2559050" y="0"/>
-                </a:lnTo>
-                <a:cubicBezTo>
-                  <a:pt x="2559050" y="1413324"/>
-                  <a:pt x="1413324" y="2559050"/>
-                  <a:pt x="0" y="2559050"/>
-                </a:cubicBezTo>
-                <a:close/>
-              </a:path>
-            </a:pathLst>
-          </a:custGeom>
-          <a:ln>
-            <a:noFill/>
-          </a:ln>
-        </p:spPr>
-        <p:style>
-          <a:lnRef idx="2">
-            <a:schemeClr val="accent1">
-              <a:shade val="50000"/>
-            </a:schemeClr>
-          </a:lnRef>
-          <a:fillRef idx="1">
-            <a:schemeClr val="accent1"/>
-          </a:fillRef>
-          <a:effectRef idx="0">
-            <a:schemeClr val="accent1"/>
-          </a:effectRef>
-          <a:fontRef idx="minor">
-            <a:schemeClr val="lt1"/>
-          </a:fontRef>
-        </p:style>
-        <p:txBody>
-          <a:bodyPr wrap="square" rtlCol="0" anchor="ctr">
-            <a:noAutofit/>
-          </a:bodyPr>
-          <a:lstStyle/>
-          <a:p>
-            <a:pPr algn="ctr"/>
-            <a:endParaRPr lang="en-US">
-              <a:solidFill>
-                <a:schemeClr val="tx1"/>
-              </a:solidFill>
-            </a:endParaRPr>
-          </a:p>
-        </p:txBody>
-      </p:sp>
-      <p:sp>
-        <p:nvSpPr>
-          <p:cNvPr id="4" name="Title 3">
-            <a:extLst>
-              <a:ext uri="{FF2B5EF4-FFF2-40B4-BE49-F238E27FC236}">
-                <a16:creationId xmlns:a16="http://schemas.microsoft.com/office/drawing/2014/main" id="{F3C64553-708A-4173-9EE8-5A2F043ABDCE}"/>
-              </a:ext>
-            </a:extLst>
-          </p:cNvPr>
-          <p:cNvSpPr>
-            <a:spLocks noGrp="1"/>
-          </p:cNvSpPr>
-          <p:nvPr>
-            <p:ph type="title"/>
-          </p:nvPr>
-        </p:nvSpPr>
-        <p:spPr>
-          <a:xfrm>
-            <a:off x="1084728" y="2844177"/>
-            <a:ext cx="4272646" cy="1916084"/>
-          </a:xfrm>
-        </p:spPr>
-        <p:txBody>
-          <a:bodyPr vert="horz" lIns="91440" tIns="45720" rIns="91440" bIns="45720" rtlCol="0" anchor="b">
-            <a:normAutofit/>
-          </a:bodyPr>
-          <a:lstStyle/>
-          <a:p>
-            <a:pPr algn="ctr"/>
-            <a:r>
-              <a:rPr lang="en-US" dirty="0"/>
-              <a:t>Any questions?</a:t>
-            </a:r>
-          </a:p>
-        </p:txBody>
-      </p:sp>
-      <p:sp>
-        <p:nvSpPr>
-          <p:cNvPr id="17" name="Rectangle 16">
-            <a:extLst>
-              <a:ext uri="{FF2B5EF4-FFF2-40B4-BE49-F238E27FC236}">
-                <a16:creationId xmlns:a16="http://schemas.microsoft.com/office/drawing/2014/main" id="{B19BE792-26DE-40FA-A8C8-F3D6378FC9FC}"/>
-              </a:ext>
-              <a:ext uri="{C183D7F6-B498-43B3-948B-1728B52AA6E4}">
-                <adec:decorative xmlns:adec="http://schemas.microsoft.com/office/drawing/2017/decorative" val="1"/>
-              </a:ext>
-            </a:extLst>
-          </p:cNvPr>
-          <p:cNvSpPr>
-            <a:spLocks noGrp="1" noRot="1" noChangeAspect="1" noMove="1" noResize="1" noEditPoints="1" noAdjustHandles="1" noChangeArrowheads="1" noChangeShapeType="1" noTextEdit="1"/>
-          </p:cNvSpPr>
-          <p:nvPr>
-            <p:extLst>
-              <p:ext uri="{386F3935-93C4-4BCD-93E2-E3B085C9AB24}">
-                <p16:designElem xmlns:p16="http://schemas.microsoft.com/office/powerpoint/2015/main" val="1"/>
-              </p:ext>
-            </p:extLst>
-          </p:nvPr>
-        </p:nvSpPr>
-        <p:spPr>
-          <a:xfrm rot="5400000">
-            <a:off x="6988933" y="-21461"/>
-            <a:ext cx="1703094" cy="1746020"/>
-          </a:xfrm>
-          <a:prstGeom prst="rect">
-            <a:avLst/>
-          </a:prstGeom>
-          <a:solidFill>
-            <a:schemeClr val="accent1">
-              <a:lumMod val="60000"/>
-              <a:lumOff val="40000"/>
-            </a:schemeClr>
-          </a:solidFill>
-          <a:ln>
-            <a:noFill/>
-          </a:ln>
-        </p:spPr>
-        <p:style>
-          <a:lnRef idx="2">
-            <a:schemeClr val="accent1">
-              <a:shade val="50000"/>
-            </a:schemeClr>
-          </a:lnRef>
-          <a:fillRef idx="1">
-            <a:schemeClr val="accent1"/>
-          </a:fillRef>
-          <a:effectRef idx="0">
-            <a:schemeClr val="accent1"/>
-          </a:effectRef>
-          <a:fontRef idx="minor">
-            <a:schemeClr val="lt1"/>
-          </a:fontRef>
-        </p:style>
-        <p:txBody>
-          <a:bodyPr rtlCol="0" anchor="ctr"/>
-          <a:lstStyle/>
-          <a:p>
-            <a:pPr algn="ctr"/>
-            <a:endParaRPr lang="en-US" dirty="0"/>
-          </a:p>
-        </p:txBody>
-      </p:sp>
-      <p:sp>
-        <p:nvSpPr>
-          <p:cNvPr id="19" name="Rectangle 3">
-            <a:extLst>
-              <a:ext uri="{FF2B5EF4-FFF2-40B4-BE49-F238E27FC236}">
-                <a16:creationId xmlns:a16="http://schemas.microsoft.com/office/drawing/2014/main" id="{11CBEA76-37A2-4726-8123-EBCACA121EF8}"/>
-              </a:ext>
-              <a:ext uri="{C183D7F6-B498-43B3-948B-1728B52AA6E4}">
-                <adec:decorative xmlns:adec="http://schemas.microsoft.com/office/drawing/2017/decorative" val="1"/>
-              </a:ext>
-            </a:extLst>
-          </p:cNvPr>
-          <p:cNvSpPr>
-            <a:spLocks noGrp="1" noRot="1" noChangeAspect="1" noMove="1" noResize="1" noEditPoints="1" noAdjustHandles="1" noChangeArrowheads="1" noChangeShapeType="1" noTextEdit="1"/>
-          </p:cNvSpPr>
-          <p:nvPr>
-            <p:extLst>
-              <p:ext uri="{386F3935-93C4-4BCD-93E2-E3B085C9AB24}">
-                <p16:designElem xmlns:p16="http://schemas.microsoft.com/office/powerpoint/2015/main" val="1"/>
-              </p:ext>
-            </p:extLst>
-          </p:nvPr>
-        </p:nvSpPr>
-        <p:spPr>
-          <a:xfrm rot="5400000">
-            <a:off x="6988055" y="-22336"/>
-            <a:ext cx="1704847" cy="1746021"/>
-          </a:xfrm>
-          <a:custGeom>
-            <a:avLst/>
-            <a:gdLst>
-              <a:gd name="connsiteX0" fmla="*/ 0 w 3488602"/>
-              <a:gd name="connsiteY0" fmla="*/ 0 h 3433573"/>
-              <a:gd name="connsiteX1" fmla="*/ 3488602 w 3488602"/>
-              <a:gd name="connsiteY1" fmla="*/ 0 h 3433573"/>
-              <a:gd name="connsiteX2" fmla="*/ 3488602 w 3488602"/>
-              <a:gd name="connsiteY2" fmla="*/ 3433573 h 3433573"/>
-              <a:gd name="connsiteX3" fmla="*/ 0 w 3488602"/>
-              <a:gd name="connsiteY3" fmla="*/ 3433573 h 3433573"/>
-              <a:gd name="connsiteX4" fmla="*/ 0 w 3488602"/>
-              <a:gd name="connsiteY4" fmla="*/ 0 h 3433573"/>
-              <a:gd name="connsiteX0" fmla="*/ 0 w 3488602"/>
-              <a:gd name="connsiteY0" fmla="*/ 0 h 3433573"/>
-              <a:gd name="connsiteX1" fmla="*/ 3488602 w 3488602"/>
-              <a:gd name="connsiteY1" fmla="*/ 0 h 3433573"/>
-              <a:gd name="connsiteX2" fmla="*/ 0 w 3488602"/>
-              <a:gd name="connsiteY2" fmla="*/ 3433573 h 3433573"/>
-              <a:gd name="connsiteX3" fmla="*/ 0 w 3488602"/>
-              <a:gd name="connsiteY3" fmla="*/ 0 h 3433573"/>
-            </a:gdLst>
-            <a:ahLst/>
-            <a:cxnLst>
-              <a:cxn ang="0">
-                <a:pos x="connsiteX0" y="connsiteY0"/>
-              </a:cxn>
-              <a:cxn ang="0">
-                <a:pos x="connsiteX1" y="connsiteY1"/>
-              </a:cxn>
-              <a:cxn ang="0">
-                <a:pos x="connsiteX2" y="connsiteY2"/>
-              </a:cxn>
-              <a:cxn ang="0">
-                <a:pos x="connsiteX3" y="connsiteY3"/>
-              </a:cxn>
-            </a:cxnLst>
-            <a:rect l="l" t="t" r="r" b="b"/>
-            <a:pathLst>
-              <a:path w="3488602" h="3433573">
-                <a:moveTo>
-                  <a:pt x="0" y="0"/>
-                </a:moveTo>
-                <a:lnTo>
-                  <a:pt x="3488602" y="0"/>
-                </a:lnTo>
-                <a:lnTo>
-                  <a:pt x="0" y="3433573"/>
-                </a:lnTo>
-                <a:lnTo>
-                  <a:pt x="0" y="0"/>
-                </a:lnTo>
-                <a:close/>
-              </a:path>
-            </a:pathLst>
-          </a:custGeom>
-          <a:solidFill>
-            <a:schemeClr val="accent4">
-              <a:lumMod val="40000"/>
-              <a:lumOff val="60000"/>
-            </a:schemeClr>
-          </a:solidFill>
-          <a:ln>
-            <a:noFill/>
-          </a:ln>
-        </p:spPr>
-        <p:style>
-          <a:lnRef idx="2">
-            <a:schemeClr val="accent1">
-              <a:shade val="50000"/>
-            </a:schemeClr>
-          </a:lnRef>
-          <a:fillRef idx="1">
-            <a:schemeClr val="accent1"/>
-          </a:fillRef>
-          <a:effectRef idx="0">
-            <a:schemeClr val="accent1"/>
-          </a:effectRef>
-          <a:fontRef idx="minor">
-            <a:schemeClr val="lt1"/>
-          </a:fontRef>
-        </p:style>
-        <p:txBody>
-          <a:bodyPr rtlCol="0" anchor="ctr"/>
-          <a:lstStyle/>
-          <a:p>
-            <a:pPr algn="ctr"/>
-            <a:endParaRPr lang="en-US" dirty="0"/>
-          </a:p>
-        </p:txBody>
-      </p:sp>
-      <p:sp>
-        <p:nvSpPr>
-          <p:cNvPr id="21" name="Rectangle 20">
-            <a:extLst>
-              <a:ext uri="{FF2B5EF4-FFF2-40B4-BE49-F238E27FC236}">
-                <a16:creationId xmlns:a16="http://schemas.microsoft.com/office/drawing/2014/main" id="{CDDA81B4-3959-48A2-823E-19B014A03BA9}"/>
-              </a:ext>
-              <a:ext uri="{C183D7F6-B498-43B3-948B-1728B52AA6E4}">
-                <adec:decorative xmlns:adec="http://schemas.microsoft.com/office/drawing/2017/decorative" val="1"/>
-              </a:ext>
-            </a:extLst>
-          </p:cNvPr>
-          <p:cNvSpPr>
-            <a:spLocks noGrp="1" noRot="1" noChangeAspect="1" noMove="1" noResize="1" noEditPoints="1" noAdjustHandles="1" noChangeArrowheads="1" noChangeShapeType="1" noTextEdit="1"/>
-          </p:cNvSpPr>
-          <p:nvPr>
-            <p:extLst>
-              <p:ext uri="{386F3935-93C4-4BCD-93E2-E3B085C9AB24}">
-                <p16:designElem xmlns:p16="http://schemas.microsoft.com/office/powerpoint/2015/main" val="1"/>
-              </p:ext>
-            </p:extLst>
-          </p:nvPr>
-        </p:nvSpPr>
-        <p:spPr>
-          <a:xfrm rot="5400000">
-            <a:off x="6978388" y="1692178"/>
-            <a:ext cx="1724184" cy="1746020"/>
-          </a:xfrm>
-          <a:prstGeom prst="rect">
-            <a:avLst/>
-          </a:prstGeom>
-          <a:solidFill>
-            <a:schemeClr val="accent5"/>
-          </a:solidFill>
-          <a:ln>
-            <a:noFill/>
-          </a:ln>
-        </p:spPr>
-        <p:style>
-          <a:lnRef idx="2">
-            <a:schemeClr val="accent1">
-              <a:shade val="50000"/>
-            </a:schemeClr>
-          </a:lnRef>
-          <a:fillRef idx="1">
-            <a:schemeClr val="accent1"/>
-          </a:fillRef>
-          <a:effectRef idx="0">
-            <a:schemeClr val="accent1"/>
-          </a:effectRef>
-          <a:fontRef idx="minor">
-            <a:schemeClr val="lt1"/>
-          </a:fontRef>
-        </p:style>
-        <p:txBody>
-          <a:bodyPr rtlCol="0" anchor="ctr"/>
-          <a:lstStyle/>
-          <a:p>
-            <a:pPr algn="ctr"/>
-            <a:endParaRPr lang="en-US" dirty="0"/>
-          </a:p>
-        </p:txBody>
-      </p:sp>
-      <p:sp>
-        <p:nvSpPr>
-          <p:cNvPr id="23" name="Freeform: Shape 22">
-            <a:extLst>
-              <a:ext uri="{FF2B5EF4-FFF2-40B4-BE49-F238E27FC236}">
-                <a16:creationId xmlns:a16="http://schemas.microsoft.com/office/drawing/2014/main" id="{5B8CC051-49B8-488A-B0AD-50A29E1D32E3}"/>
-              </a:ext>
-              <a:ext uri="{C183D7F6-B498-43B3-948B-1728B52AA6E4}">
-                <adec:decorative xmlns:adec="http://schemas.microsoft.com/office/drawing/2017/decorative" val="1"/>
-              </a:ext>
-            </a:extLst>
-          </p:cNvPr>
-          <p:cNvSpPr>
-            <a:spLocks noGrp="1" noRot="1" noChangeAspect="1" noMove="1" noResize="1" noEditPoints="1" noAdjustHandles="1" noChangeArrowheads="1" noChangeShapeType="1" noTextEdit="1"/>
-          </p:cNvSpPr>
-          <p:nvPr>
-            <p:extLst>
-              <p:ext uri="{386F3935-93C4-4BCD-93E2-E3B085C9AB24}">
-                <p16:designElem xmlns:p16="http://schemas.microsoft.com/office/powerpoint/2015/main" val="1"/>
-              </p:ext>
-            </p:extLst>
-          </p:nvPr>
-        </p:nvSpPr>
-        <p:spPr>
-          <a:xfrm rot="10800000" flipV="1">
-            <a:off x="6968949" y="1703064"/>
-            <a:ext cx="1744539" cy="862967"/>
-          </a:xfrm>
-          <a:custGeom>
-            <a:avLst/>
-            <a:gdLst>
-              <a:gd name="connsiteX0" fmla="*/ 3433574 w 3433574"/>
-              <a:gd name="connsiteY0" fmla="*/ 0 h 1716787"/>
-              <a:gd name="connsiteX1" fmla="*/ 1716787 w 3433574"/>
-              <a:gd name="connsiteY1" fmla="*/ 0 h 1716787"/>
-              <a:gd name="connsiteX2" fmla="*/ 0 w 3433574"/>
-              <a:gd name="connsiteY2" fmla="*/ 0 h 1716787"/>
-              <a:gd name="connsiteX3" fmla="*/ 1716787 w 3433574"/>
-              <a:gd name="connsiteY3" fmla="*/ 1716787 h 1716787"/>
-              <a:gd name="connsiteX4" fmla="*/ 3433574 w 3433574"/>
-              <a:gd name="connsiteY4" fmla="*/ 0 h 1716787"/>
-            </a:gdLst>
-            <a:ahLst/>
-            <a:cxnLst>
-              <a:cxn ang="0">
-                <a:pos x="connsiteX0" y="connsiteY0"/>
-              </a:cxn>
-              <a:cxn ang="0">
-                <a:pos x="connsiteX1" y="connsiteY1"/>
-              </a:cxn>
-              <a:cxn ang="0">
-                <a:pos x="connsiteX2" y="connsiteY2"/>
-              </a:cxn>
-              <a:cxn ang="0">
-                <a:pos x="connsiteX3" y="connsiteY3"/>
-              </a:cxn>
-              <a:cxn ang="0">
-                <a:pos x="connsiteX4" y="connsiteY4"/>
-              </a:cxn>
-            </a:cxnLst>
-            <a:rect l="l" t="t" r="r" b="b"/>
-            <a:pathLst>
-              <a:path w="3433574" h="1716787">
-                <a:moveTo>
-                  <a:pt x="3433574" y="0"/>
-                </a:moveTo>
-                <a:lnTo>
-                  <a:pt x="1716787" y="0"/>
-                </a:lnTo>
-                <a:lnTo>
-                  <a:pt x="0" y="0"/>
-                </a:lnTo>
-                <a:cubicBezTo>
-                  <a:pt x="0" y="948155"/>
-                  <a:pt x="768632" y="1716787"/>
-                  <a:pt x="1716787" y="1716787"/>
-                </a:cubicBezTo>
-                <a:cubicBezTo>
-                  <a:pt x="2664942" y="1716787"/>
-                  <a:pt x="3433574" y="948155"/>
-                  <a:pt x="3433574" y="0"/>
-                </a:cubicBezTo>
-                <a:close/>
-              </a:path>
-            </a:pathLst>
-          </a:custGeom>
-          <a:solidFill>
-            <a:schemeClr val="accent4">
-              <a:lumMod val="40000"/>
-              <a:lumOff val="60000"/>
-            </a:schemeClr>
-          </a:solidFill>
-          <a:ln>
-            <a:noFill/>
-          </a:ln>
-        </p:spPr>
-        <p:style>
-          <a:lnRef idx="2">
-            <a:schemeClr val="accent1">
-              <a:shade val="50000"/>
-            </a:schemeClr>
-          </a:lnRef>
-          <a:fillRef idx="1">
-            <a:schemeClr val="accent1"/>
-          </a:fillRef>
-          <a:effectRef idx="0">
-            <a:schemeClr val="accent1"/>
-          </a:effectRef>
-          <a:fontRef idx="minor">
-            <a:schemeClr val="lt1"/>
-          </a:fontRef>
-        </p:style>
-        <p:txBody>
-          <a:bodyPr wrap="square" rtlCol="0" anchor="ctr">
-            <a:noAutofit/>
-          </a:bodyPr>
-          <a:lstStyle/>
-          <a:p>
-            <a:pPr algn="ctr"/>
-            <a:endParaRPr lang="en-US">
-              <a:solidFill>
-                <a:schemeClr val="tx1"/>
-              </a:solidFill>
-            </a:endParaRPr>
-          </a:p>
-        </p:txBody>
-      </p:sp>
-      <p:sp>
-        <p:nvSpPr>
-          <p:cNvPr id="25" name="Freeform: Shape 24">
-            <a:extLst>
-              <a:ext uri="{FF2B5EF4-FFF2-40B4-BE49-F238E27FC236}">
-                <a16:creationId xmlns:a16="http://schemas.microsoft.com/office/drawing/2014/main" id="{A49FB65E-C02E-4FD7-B476-0B213C638B25}"/>
-              </a:ext>
-              <a:ext uri="{C183D7F6-B498-43B3-948B-1728B52AA6E4}">
-                <adec:decorative xmlns:adec="http://schemas.microsoft.com/office/drawing/2017/decorative" val="1"/>
-              </a:ext>
-            </a:extLst>
-          </p:cNvPr>
-          <p:cNvSpPr>
-            <a:spLocks noGrp="1" noRot="1" noChangeAspect="1" noMove="1" noResize="1" noEditPoints="1" noAdjustHandles="1" noChangeArrowheads="1" noChangeShapeType="1" noTextEdit="1"/>
-          </p:cNvSpPr>
-          <p:nvPr>
-            <p:extLst>
-              <p:ext uri="{386F3935-93C4-4BCD-93E2-E3B085C9AB24}">
-                <p16:designElem xmlns:p16="http://schemas.microsoft.com/office/powerpoint/2015/main" val="1"/>
-              </p:ext>
-            </p:extLst>
-          </p:nvPr>
-        </p:nvSpPr>
-        <p:spPr>
-          <a:xfrm rot="10800000" flipV="1">
-            <a:off x="6968949" y="2566032"/>
-            <a:ext cx="1744539" cy="862967"/>
-          </a:xfrm>
-          <a:custGeom>
-            <a:avLst/>
-            <a:gdLst>
-              <a:gd name="connsiteX0" fmla="*/ 3433574 w 3433574"/>
-              <a:gd name="connsiteY0" fmla="*/ 0 h 1716787"/>
-              <a:gd name="connsiteX1" fmla="*/ 1716787 w 3433574"/>
-              <a:gd name="connsiteY1" fmla="*/ 0 h 1716787"/>
-              <a:gd name="connsiteX2" fmla="*/ 0 w 3433574"/>
-              <a:gd name="connsiteY2" fmla="*/ 0 h 1716787"/>
-              <a:gd name="connsiteX3" fmla="*/ 1716787 w 3433574"/>
-              <a:gd name="connsiteY3" fmla="*/ 1716787 h 1716787"/>
-              <a:gd name="connsiteX4" fmla="*/ 3433574 w 3433574"/>
-              <a:gd name="connsiteY4" fmla="*/ 0 h 1716787"/>
-            </a:gdLst>
-            <a:ahLst/>
-            <a:cxnLst>
-              <a:cxn ang="0">
-                <a:pos x="connsiteX0" y="connsiteY0"/>
-              </a:cxn>
-              <a:cxn ang="0">
-                <a:pos x="connsiteX1" y="connsiteY1"/>
-              </a:cxn>
-              <a:cxn ang="0">
-                <a:pos x="connsiteX2" y="connsiteY2"/>
-              </a:cxn>
-              <a:cxn ang="0">
-                <a:pos x="connsiteX3" y="connsiteY3"/>
-              </a:cxn>
-              <a:cxn ang="0">
-                <a:pos x="connsiteX4" y="connsiteY4"/>
-              </a:cxn>
-            </a:cxnLst>
-            <a:rect l="l" t="t" r="r" b="b"/>
-            <a:pathLst>
-              <a:path w="3433574" h="1716787">
-                <a:moveTo>
-                  <a:pt x="3433574" y="0"/>
-                </a:moveTo>
-                <a:lnTo>
-                  <a:pt x="1716787" y="0"/>
-                </a:lnTo>
-                <a:lnTo>
-                  <a:pt x="0" y="0"/>
-                </a:lnTo>
-                <a:cubicBezTo>
-                  <a:pt x="0" y="948155"/>
-                  <a:pt x="768632" y="1716787"/>
-                  <a:pt x="1716787" y="1716787"/>
-                </a:cubicBezTo>
-                <a:cubicBezTo>
-                  <a:pt x="2664942" y="1716787"/>
-                  <a:pt x="3433574" y="948155"/>
-                  <a:pt x="3433574" y="0"/>
-                </a:cubicBezTo>
-                <a:close/>
-              </a:path>
-            </a:pathLst>
-          </a:custGeom>
-          <a:solidFill>
-            <a:schemeClr val="accent4">
-              <a:lumMod val="40000"/>
-              <a:lumOff val="60000"/>
-            </a:schemeClr>
-          </a:solidFill>
-          <a:ln>
-            <a:noFill/>
-          </a:ln>
-        </p:spPr>
-        <p:style>
-          <a:lnRef idx="2">
-            <a:schemeClr val="accent1">
-              <a:shade val="50000"/>
-            </a:schemeClr>
-          </a:lnRef>
-          <a:fillRef idx="1">
-            <a:schemeClr val="accent1"/>
-          </a:fillRef>
-          <a:effectRef idx="0">
-            <a:schemeClr val="accent1"/>
-          </a:effectRef>
-          <a:fontRef idx="minor">
-            <a:schemeClr val="lt1"/>
-          </a:fontRef>
-        </p:style>
-        <p:txBody>
-          <a:bodyPr wrap="square" rtlCol="0" anchor="ctr">
-            <a:noAutofit/>
-          </a:bodyPr>
-          <a:lstStyle/>
-          <a:p>
-            <a:pPr algn="ctr"/>
-            <a:endParaRPr lang="en-US">
-              <a:solidFill>
-                <a:schemeClr val="tx1"/>
-              </a:solidFill>
-            </a:endParaRPr>
-          </a:p>
-        </p:txBody>
-      </p:sp>
-      <p:sp>
-        <p:nvSpPr>
-          <p:cNvPr id="27" name="Rectangle 26">
-            <a:extLst>
-              <a:ext uri="{FF2B5EF4-FFF2-40B4-BE49-F238E27FC236}">
-                <a16:creationId xmlns:a16="http://schemas.microsoft.com/office/drawing/2014/main" id="{FB7EBD78-005D-4F93-BEA0-95DF292B3827}"/>
-              </a:ext>
-              <a:ext uri="{C183D7F6-B498-43B3-948B-1728B52AA6E4}">
-                <adec:decorative xmlns:adec="http://schemas.microsoft.com/office/drawing/2017/decorative" val="1"/>
-              </a:ext>
-            </a:extLst>
-          </p:cNvPr>
-          <p:cNvSpPr>
-            <a:spLocks noGrp="1" noRot="1" noChangeAspect="1" noMove="1" noResize="1" noEditPoints="1" noAdjustHandles="1" noChangeArrowheads="1" noChangeShapeType="1" noTextEdit="1"/>
-          </p:cNvSpPr>
-          <p:nvPr>
-            <p:extLst>
-              <p:ext uri="{386F3935-93C4-4BCD-93E2-E3B085C9AB24}">
-                <p16:designElem xmlns:p16="http://schemas.microsoft.com/office/powerpoint/2015/main" val="1"/>
-              </p:ext>
-            </p:extLst>
-          </p:nvPr>
-        </p:nvSpPr>
-        <p:spPr>
-          <a:xfrm rot="5400000">
-            <a:off x="8738250" y="-24765"/>
-            <a:ext cx="3427285" cy="3476805"/>
-          </a:xfrm>
-          <a:prstGeom prst="rect">
-            <a:avLst/>
-          </a:prstGeom>
-          <a:solidFill>
-            <a:schemeClr val="accent1">
-              <a:lumMod val="60000"/>
-              <a:lumOff val="40000"/>
-            </a:schemeClr>
-          </a:solidFill>
-          <a:ln>
-            <a:noFill/>
-          </a:ln>
-        </p:spPr>
-        <p:style>
-          <a:lnRef idx="2">
-            <a:schemeClr val="accent1">
-              <a:shade val="50000"/>
-            </a:schemeClr>
-          </a:lnRef>
-          <a:fillRef idx="1">
-            <a:schemeClr val="accent1"/>
-          </a:fillRef>
-          <a:effectRef idx="0">
-            <a:schemeClr val="accent1"/>
-          </a:effectRef>
-          <a:fontRef idx="minor">
-            <a:schemeClr val="lt1"/>
-          </a:fontRef>
-        </p:style>
-        <p:txBody>
-          <a:bodyPr rtlCol="0" anchor="ctr"/>
-          <a:lstStyle/>
-          <a:p>
-            <a:pPr algn="ctr"/>
-            <a:endParaRPr lang="en-US" dirty="0"/>
-          </a:p>
-        </p:txBody>
-      </p:sp>
-      <p:sp>
-        <p:nvSpPr>
-          <p:cNvPr id="29" name="Oval 28">
-            <a:extLst>
-              <a:ext uri="{FF2B5EF4-FFF2-40B4-BE49-F238E27FC236}">
-                <a16:creationId xmlns:a16="http://schemas.microsoft.com/office/drawing/2014/main" id="{8CB81301-287D-4882-AD9B-E44D8E122095}"/>
-              </a:ext>
-              <a:ext uri="{C183D7F6-B498-43B3-948B-1728B52AA6E4}">
-                <adec:decorative xmlns:adec="http://schemas.microsoft.com/office/drawing/2017/decorative" val="1"/>
-              </a:ext>
-            </a:extLst>
-          </p:cNvPr>
-          <p:cNvSpPr>
-            <a:spLocks noGrp="1" noRot="1" noChangeAspect="1" noMove="1" noResize="1" noEditPoints="1" noAdjustHandles="1" noChangeArrowheads="1" noChangeShapeType="1" noTextEdit="1"/>
-          </p:cNvSpPr>
-          <p:nvPr>
-            <p:extLst>
-              <p:ext uri="{386F3935-93C4-4BCD-93E2-E3B085C9AB24}">
-                <p16:designElem xmlns:p16="http://schemas.microsoft.com/office/powerpoint/2015/main" val="1"/>
-              </p:ext>
-            </p:extLst>
-          </p:nvPr>
-        </p:nvSpPr>
-        <p:spPr>
-          <a:xfrm>
-            <a:off x="8914500" y="178410"/>
-            <a:ext cx="3070455" cy="3070455"/>
-          </a:xfrm>
-          <a:prstGeom prst="ellipse">
-            <a:avLst/>
-          </a:prstGeom>
-          <a:solidFill>
-            <a:schemeClr val="accent2"/>
-          </a:solidFill>
-          <a:ln>
-            <a:noFill/>
-          </a:ln>
-        </p:spPr>
-        <p:style>
-          <a:lnRef idx="2">
-            <a:schemeClr val="accent1">
-              <a:shade val="50000"/>
-            </a:schemeClr>
-          </a:lnRef>
-          <a:fillRef idx="1">
-            <a:schemeClr val="accent1"/>
-          </a:fillRef>
-          <a:effectRef idx="0">
-            <a:schemeClr val="accent1"/>
-          </a:effectRef>
-          <a:fontRef idx="minor">
-            <a:schemeClr val="lt1"/>
-          </a:fontRef>
-        </p:style>
-        <p:txBody>
-          <a:bodyPr rtlCol="0" anchor="ctr"/>
-          <a:lstStyle/>
-          <a:p>
-            <a:pPr algn="ctr"/>
-            <a:endParaRPr lang="en-US"/>
-          </a:p>
-        </p:txBody>
-      </p:sp>
-      <p:sp>
-        <p:nvSpPr>
-          <p:cNvPr id="31" name="Rectangle 30">
-            <a:extLst>
-              <a:ext uri="{FF2B5EF4-FFF2-40B4-BE49-F238E27FC236}">
-                <a16:creationId xmlns:a16="http://schemas.microsoft.com/office/drawing/2014/main" id="{1122F9F7-A178-468E-AF59-8DD67246E43A}"/>
-              </a:ext>
-              <a:ext uri="{C183D7F6-B498-43B3-948B-1728B52AA6E4}">
-                <adec:decorative xmlns:adec="http://schemas.microsoft.com/office/drawing/2017/decorative" val="1"/>
-              </a:ext>
-            </a:extLst>
-          </p:cNvPr>
-          <p:cNvSpPr>
-            <a:spLocks noGrp="1" noRot="1" noChangeAspect="1" noMove="1" noResize="1" noEditPoints="1" noAdjustHandles="1" noChangeArrowheads="1" noChangeShapeType="1" noTextEdit="1"/>
-          </p:cNvSpPr>
-          <p:nvPr>
-            <p:extLst>
-              <p:ext uri="{386F3935-93C4-4BCD-93E2-E3B085C9AB24}">
-                <p16:designElem xmlns:p16="http://schemas.microsoft.com/office/powerpoint/2015/main" val="1"/>
-              </p:ext>
-            </p:extLst>
-          </p:nvPr>
-        </p:nvSpPr>
-        <p:spPr>
-          <a:xfrm rot="5400000">
-            <a:off x="6122799" y="4271951"/>
-            <a:ext cx="3435362" cy="1746020"/>
-          </a:xfrm>
-          <a:prstGeom prst="rect">
-            <a:avLst/>
-          </a:prstGeom>
-          <a:solidFill>
-            <a:schemeClr val="accent2"/>
-          </a:solidFill>
-          <a:ln>
-            <a:noFill/>
-          </a:ln>
-        </p:spPr>
-        <p:style>
-          <a:lnRef idx="2">
-            <a:schemeClr val="accent1">
-              <a:shade val="50000"/>
-            </a:schemeClr>
-          </a:lnRef>
-          <a:fillRef idx="1">
-            <a:schemeClr val="accent1"/>
-          </a:fillRef>
-          <a:effectRef idx="0">
-            <a:schemeClr val="accent1"/>
-          </a:effectRef>
-          <a:fontRef idx="minor">
-            <a:schemeClr val="lt1"/>
-          </a:fontRef>
-        </p:style>
-        <p:txBody>
-          <a:bodyPr rtlCol="0" anchor="ctr"/>
-          <a:lstStyle/>
-          <a:p>
-            <a:pPr algn="ctr"/>
-            <a:endParaRPr lang="en-US" dirty="0"/>
-          </a:p>
-        </p:txBody>
-      </p:sp>
-      <p:sp>
-        <p:nvSpPr>
-          <p:cNvPr id="33" name="Freeform: Shape 32">
-            <a:extLst>
-              <a:ext uri="{FF2B5EF4-FFF2-40B4-BE49-F238E27FC236}">
-                <a16:creationId xmlns:a16="http://schemas.microsoft.com/office/drawing/2014/main" id="{76420B0A-CC71-4BD3-BA69-E9B2B6F1E57A}"/>
-              </a:ext>
-              <a:ext uri="{C183D7F6-B498-43B3-948B-1728B52AA6E4}">
-                <adec:decorative xmlns:adec="http://schemas.microsoft.com/office/drawing/2017/decorative" val="1"/>
-              </a:ext>
-            </a:extLst>
-          </p:cNvPr>
-          <p:cNvSpPr>
-            <a:spLocks noGrp="1" noRot="1" noChangeAspect="1" noMove="1" noResize="1" noEditPoints="1" noAdjustHandles="1" noChangeArrowheads="1" noChangeShapeType="1" noTextEdit="1"/>
-          </p:cNvSpPr>
-          <p:nvPr>
-            <p:extLst>
-              <p:ext uri="{386F3935-93C4-4BCD-93E2-E3B085C9AB24}">
-                <p16:designElem xmlns:p16="http://schemas.microsoft.com/office/powerpoint/2015/main" val="1"/>
-              </p:ext>
-            </p:extLst>
-          </p:nvPr>
-        </p:nvSpPr>
-        <p:spPr>
-          <a:xfrm rot="5400000" flipV="1">
-            <a:off x="6122814" y="4271933"/>
-            <a:ext cx="3435331" cy="1746022"/>
-          </a:xfrm>
-          <a:custGeom>
-            <a:avLst/>
-            <a:gdLst>
-              <a:gd name="connsiteX0" fmla="*/ 3433574 w 3433574"/>
-              <a:gd name="connsiteY0" fmla="*/ 0 h 1716787"/>
-              <a:gd name="connsiteX1" fmla="*/ 1716787 w 3433574"/>
-              <a:gd name="connsiteY1" fmla="*/ 0 h 1716787"/>
-              <a:gd name="connsiteX2" fmla="*/ 0 w 3433574"/>
-              <a:gd name="connsiteY2" fmla="*/ 0 h 1716787"/>
-              <a:gd name="connsiteX3" fmla="*/ 1716787 w 3433574"/>
-              <a:gd name="connsiteY3" fmla="*/ 1716787 h 1716787"/>
-              <a:gd name="connsiteX4" fmla="*/ 3433574 w 3433574"/>
-              <a:gd name="connsiteY4" fmla="*/ 0 h 1716787"/>
-            </a:gdLst>
-            <a:ahLst/>
-            <a:cxnLst>
-              <a:cxn ang="0">
-                <a:pos x="connsiteX0" y="connsiteY0"/>
-              </a:cxn>
-              <a:cxn ang="0">
-                <a:pos x="connsiteX1" y="connsiteY1"/>
-              </a:cxn>
-              <a:cxn ang="0">
-                <a:pos x="connsiteX2" y="connsiteY2"/>
-              </a:cxn>
-              <a:cxn ang="0">
-                <a:pos x="connsiteX3" y="connsiteY3"/>
-              </a:cxn>
-              <a:cxn ang="0">
-                <a:pos x="connsiteX4" y="connsiteY4"/>
-              </a:cxn>
-            </a:cxnLst>
-            <a:rect l="l" t="t" r="r" b="b"/>
-            <a:pathLst>
-              <a:path w="3433574" h="1716787">
-                <a:moveTo>
-                  <a:pt x="3433574" y="0"/>
-                </a:moveTo>
-                <a:lnTo>
-                  <a:pt x="1716787" y="0"/>
-                </a:lnTo>
-                <a:lnTo>
-                  <a:pt x="0" y="0"/>
-                </a:lnTo>
-                <a:cubicBezTo>
-                  <a:pt x="0" y="948155"/>
-                  <a:pt x="768632" y="1716787"/>
-                  <a:pt x="1716787" y="1716787"/>
-                </a:cubicBezTo>
-                <a:cubicBezTo>
-                  <a:pt x="2664942" y="1716787"/>
-                  <a:pt x="3433574" y="948155"/>
-                  <a:pt x="3433574" y="0"/>
-                </a:cubicBezTo>
-                <a:close/>
-              </a:path>
-            </a:pathLst>
-          </a:custGeom>
-          <a:solidFill>
-            <a:schemeClr val="accent1">
-              <a:lumMod val="60000"/>
-              <a:lumOff val="40000"/>
-            </a:schemeClr>
-          </a:solidFill>
-          <a:ln>
-            <a:noFill/>
-          </a:ln>
-        </p:spPr>
-        <p:style>
-          <a:lnRef idx="2">
-            <a:schemeClr val="accent1">
-              <a:shade val="50000"/>
-            </a:schemeClr>
-          </a:lnRef>
-          <a:fillRef idx="1">
-            <a:schemeClr val="accent1"/>
-          </a:fillRef>
-          <a:effectRef idx="0">
-            <a:schemeClr val="accent1"/>
-          </a:effectRef>
-          <a:fontRef idx="minor">
-            <a:schemeClr val="lt1"/>
-          </a:fontRef>
-        </p:style>
-        <p:txBody>
-          <a:bodyPr wrap="square" rtlCol="0" anchor="ctr">
-            <a:noAutofit/>
-          </a:bodyPr>
-          <a:lstStyle/>
-          <a:p>
-            <a:pPr algn="ctr"/>
-            <a:endParaRPr lang="en-US" dirty="0">
-              <a:solidFill>
-                <a:schemeClr val="tx1"/>
-              </a:solidFill>
-            </a:endParaRPr>
-          </a:p>
-        </p:txBody>
-      </p:sp>
-      <p:sp>
-        <p:nvSpPr>
-          <p:cNvPr id="35" name="Rectangle 34">
-            <a:extLst>
-              <a:ext uri="{FF2B5EF4-FFF2-40B4-BE49-F238E27FC236}">
-                <a16:creationId xmlns:a16="http://schemas.microsoft.com/office/drawing/2014/main" id="{E5048351-EA66-4465-9CB8-25B4C5E6800F}"/>
-              </a:ext>
-              <a:ext uri="{C183D7F6-B498-43B3-948B-1728B52AA6E4}">
-                <adec:decorative xmlns:adec="http://schemas.microsoft.com/office/drawing/2017/decorative" val="1"/>
-              </a:ext>
-            </a:extLst>
-          </p:cNvPr>
-          <p:cNvSpPr>
-            <a:spLocks noGrp="1" noRot="1" noChangeAspect="1" noMove="1" noResize="1" noEditPoints="1" noAdjustHandles="1" noChangeArrowheads="1" noChangeShapeType="1" noTextEdit="1"/>
-          </p:cNvSpPr>
-          <p:nvPr>
-            <p:extLst>
-              <p:ext uri="{386F3935-93C4-4BCD-93E2-E3B085C9AB24}">
-                <p16:designElem xmlns:p16="http://schemas.microsoft.com/office/powerpoint/2015/main" val="1"/>
-              </p:ext>
-            </p:extLst>
-          </p:nvPr>
-        </p:nvSpPr>
-        <p:spPr>
-          <a:xfrm rot="5400000">
-            <a:off x="8734228" y="3406574"/>
-            <a:ext cx="3435330" cy="3476805"/>
-          </a:xfrm>
-          <a:prstGeom prst="rect">
-            <a:avLst/>
-          </a:prstGeom>
-          <a:solidFill>
-            <a:schemeClr val="accent5"/>
-          </a:solidFill>
-          <a:ln>
-            <a:noFill/>
-          </a:ln>
-        </p:spPr>
-        <p:style>
-          <a:lnRef idx="2">
-            <a:schemeClr val="accent1">
-              <a:shade val="50000"/>
-            </a:schemeClr>
-          </a:lnRef>
-          <a:fillRef idx="1">
-            <a:schemeClr val="accent1"/>
-          </a:fillRef>
-          <a:effectRef idx="0">
-            <a:schemeClr val="accent1"/>
-          </a:effectRef>
-          <a:fontRef idx="minor">
-            <a:schemeClr val="lt1"/>
-          </a:fontRef>
-        </p:style>
-        <p:txBody>
-          <a:bodyPr rtlCol="0" anchor="ctr"/>
-          <a:lstStyle/>
-          <a:p>
-            <a:pPr algn="ctr"/>
-            <a:endParaRPr lang="en-US" dirty="0"/>
-          </a:p>
-        </p:txBody>
-      </p:sp>
-      <p:sp>
-        <p:nvSpPr>
-          <p:cNvPr id="37" name="Rectangle 3">
-            <a:extLst>
-              <a:ext uri="{FF2B5EF4-FFF2-40B4-BE49-F238E27FC236}">
-                <a16:creationId xmlns:a16="http://schemas.microsoft.com/office/drawing/2014/main" id="{BC467846-2355-4572-AC5B-89B9FFFBAA70}"/>
-              </a:ext>
-              <a:ext uri="{C183D7F6-B498-43B3-948B-1728B52AA6E4}">
-                <adec:decorative xmlns:adec="http://schemas.microsoft.com/office/drawing/2017/decorative" val="1"/>
-              </a:ext>
-            </a:extLst>
-          </p:cNvPr>
-          <p:cNvSpPr>
-            <a:spLocks noGrp="1" noRot="1" noChangeAspect="1" noMove="1" noResize="1" noEditPoints="1" noAdjustHandles="1" noChangeArrowheads="1" noChangeShapeType="1" noTextEdit="1"/>
-          </p:cNvSpPr>
-          <p:nvPr>
-            <p:extLst>
-              <p:ext uri="{386F3935-93C4-4BCD-93E2-E3B085C9AB24}">
-                <p16:designElem xmlns:p16="http://schemas.microsoft.com/office/powerpoint/2015/main" val="1"/>
-              </p:ext>
-            </p:extLst>
-          </p:nvPr>
-        </p:nvSpPr>
-        <p:spPr>
-          <a:xfrm rot="10800000">
-            <a:off x="8707457" y="3427799"/>
-            <a:ext cx="3484541" cy="3434283"/>
-          </a:xfrm>
-          <a:custGeom>
-            <a:avLst/>
-            <a:gdLst>
-              <a:gd name="connsiteX0" fmla="*/ 0 w 3488602"/>
-              <a:gd name="connsiteY0" fmla="*/ 0 h 3433573"/>
-              <a:gd name="connsiteX1" fmla="*/ 3488602 w 3488602"/>
-              <a:gd name="connsiteY1" fmla="*/ 0 h 3433573"/>
-              <a:gd name="connsiteX2" fmla="*/ 3488602 w 3488602"/>
-              <a:gd name="connsiteY2" fmla="*/ 3433573 h 3433573"/>
-              <a:gd name="connsiteX3" fmla="*/ 0 w 3488602"/>
-              <a:gd name="connsiteY3" fmla="*/ 3433573 h 3433573"/>
-              <a:gd name="connsiteX4" fmla="*/ 0 w 3488602"/>
-              <a:gd name="connsiteY4" fmla="*/ 0 h 3433573"/>
-              <a:gd name="connsiteX0" fmla="*/ 0 w 3488602"/>
-              <a:gd name="connsiteY0" fmla="*/ 0 h 3433573"/>
-              <a:gd name="connsiteX1" fmla="*/ 3488602 w 3488602"/>
-              <a:gd name="connsiteY1" fmla="*/ 0 h 3433573"/>
-              <a:gd name="connsiteX2" fmla="*/ 0 w 3488602"/>
-              <a:gd name="connsiteY2" fmla="*/ 3433573 h 3433573"/>
-              <a:gd name="connsiteX3" fmla="*/ 0 w 3488602"/>
-              <a:gd name="connsiteY3" fmla="*/ 0 h 3433573"/>
-            </a:gdLst>
-            <a:ahLst/>
-            <a:cxnLst>
-              <a:cxn ang="0">
-                <a:pos x="connsiteX0" y="connsiteY0"/>
-              </a:cxn>
-              <a:cxn ang="0">
-                <a:pos x="connsiteX1" y="connsiteY1"/>
-              </a:cxn>
-              <a:cxn ang="0">
-                <a:pos x="connsiteX2" y="connsiteY2"/>
-              </a:cxn>
-              <a:cxn ang="0">
-                <a:pos x="connsiteX3" y="connsiteY3"/>
-              </a:cxn>
-            </a:cxnLst>
-            <a:rect l="l" t="t" r="r" b="b"/>
-            <a:pathLst>
-              <a:path w="3488602" h="3433573">
-                <a:moveTo>
-                  <a:pt x="0" y="0"/>
-                </a:moveTo>
-                <a:lnTo>
-                  <a:pt x="3488602" y="0"/>
-                </a:lnTo>
-                <a:lnTo>
-                  <a:pt x="0" y="3433573"/>
-                </a:lnTo>
-                <a:lnTo>
-                  <a:pt x="0" y="0"/>
-                </a:lnTo>
-                <a:close/>
-              </a:path>
-            </a:pathLst>
-          </a:custGeom>
-          <a:solidFill>
-            <a:schemeClr val="tx2"/>
-          </a:solidFill>
-          <a:ln>
-            <a:noFill/>
-          </a:ln>
-        </p:spPr>
-        <p:style>
-          <a:lnRef idx="2">
-            <a:schemeClr val="accent1">
-              <a:shade val="50000"/>
-            </a:schemeClr>
-          </a:lnRef>
-          <a:fillRef idx="1">
-            <a:schemeClr val="accent1"/>
-          </a:fillRef>
-          <a:effectRef idx="0">
-            <a:schemeClr val="accent1"/>
-          </a:effectRef>
-          <a:fontRef idx="minor">
-            <a:schemeClr val="lt1"/>
-          </a:fontRef>
-        </p:style>
-        <p:txBody>
-          <a:bodyPr rtlCol="0" anchor="ctr"/>
-          <a:lstStyle/>
-          <a:p>
-            <a:pPr algn="ctr"/>
-            <a:endParaRPr lang="en-US" dirty="0"/>
-          </a:p>
-        </p:txBody>
-      </p:sp>
-    </p:spTree>
-    <p:extLst>
-      <p:ext uri="{BB962C8B-B14F-4D97-AF65-F5344CB8AC3E}">
-        <p14:creationId xmlns:p14="http://schemas.microsoft.com/office/powerpoint/2010/main" val="3617839981"/>
-      </p:ext>
-    </p:extLst>
-  </p:cSld>
-  <p:clrMapOvr>
-    <a:masterClrMapping/>
-  </p:clrMapOvr>
-</p:sld>
-</file>
-
-<file path=ppt/slides/slide2.xml><?xml version="1.0" encoding="utf-8"?>
-<p:sld xmlns:a="http://schemas.openxmlformats.org/drawingml/2006/main" xmlns:r="http://schemas.openxmlformats.org/officeDocument/2006/relationships" xmlns:p="http://schemas.openxmlformats.org/presentationml/2006/main">
-  <p:cSld>
-    <p:spTree>
-      <p:nvGrpSpPr>
-        <p:cNvPr id="1" name=""/>
-        <p:cNvGrpSpPr/>
-        <p:nvPr/>
-      </p:nvGrpSpPr>
-      <p:grpSpPr>
-        <a:xfrm>
-          <a:off x="0" y="0"/>
-          <a:ext cx="0" cy="0"/>
-          <a:chOff x="0" y="0"/>
-          <a:chExt cx="0" cy="0"/>
-        </a:xfrm>
-      </p:grpSpPr>
-      <p:sp>
-        <p:nvSpPr>
-          <p:cNvPr id="2" name="Title 1">
-            <a:extLst>
-              <a:ext uri="{FF2B5EF4-FFF2-40B4-BE49-F238E27FC236}">
-                <a16:creationId xmlns:a16="http://schemas.microsoft.com/office/drawing/2014/main" id="{36AC8F55-4D5A-47D8-A529-733798879A45}"/>
-              </a:ext>
-            </a:extLst>
-          </p:cNvPr>
-          <p:cNvSpPr>
-            <a:spLocks noGrp="1"/>
-          </p:cNvSpPr>
-          <p:nvPr>
-            <p:ph type="title"/>
-          </p:nvPr>
-        </p:nvSpPr>
-        <p:spPr/>
-        <p:txBody>
-          <a:bodyPr/>
-          <a:lstStyle/>
-          <a:p>
-            <a:pPr algn="ctr"/>
-            <a:r>
-              <a:rPr lang="en-US"/>
-              <a:t>Introduction</a:t>
-            </a:r>
-          </a:p>
-        </p:txBody>
-      </p:sp>
-      <p:sp>
-        <p:nvSpPr>
-          <p:cNvPr id="3" name="Content Placeholder 2">
-            <a:extLst>
-              <a:ext uri="{FF2B5EF4-FFF2-40B4-BE49-F238E27FC236}">
-                <a16:creationId xmlns:a16="http://schemas.microsoft.com/office/drawing/2014/main" id="{72A9E4C4-57CC-48E9-8D4F-E18257873CA8}"/>
-              </a:ext>
-            </a:extLst>
-          </p:cNvPr>
-          <p:cNvSpPr>
-            <a:spLocks noGrp="1"/>
-          </p:cNvSpPr>
-          <p:nvPr>
-            <p:ph idx="1"/>
-          </p:nvPr>
-        </p:nvSpPr>
-        <p:spPr/>
-        <p:txBody>
-          <a:bodyPr/>
-          <a:lstStyle/>
-          <a:p>
-            <a:r>
-              <a:rPr lang="en-US" dirty="0"/>
-              <a:t>You’ll have to scan a port sooner or later in Cyber</a:t>
-            </a:r>
-          </a:p>
-          <a:p>
-            <a:r>
-              <a:rPr lang="en-US" dirty="0"/>
-              <a:t>All it takes is that one vulnerable service</a:t>
-            </a:r>
-          </a:p>
-          <a:p>
-            <a:r>
-              <a:rPr lang="en-US" dirty="0"/>
-              <a:t>Sometimes even you don’t know what ports are open on your system</a:t>
-            </a:r>
-          </a:p>
-          <a:p>
-            <a:r>
-              <a:rPr lang="en-US" dirty="0"/>
-              <a:t>It’s a waste of time and resources to manually verify all outward-facing services and open ports</a:t>
-            </a:r>
-          </a:p>
-        </p:txBody>
-      </p:sp>
-    </p:spTree>
-    <p:extLst>
-      <p:ext uri="{BB962C8B-B14F-4D97-AF65-F5344CB8AC3E}">
-        <p14:creationId xmlns:p14="http://schemas.microsoft.com/office/powerpoint/2010/main" val="3955383912"/>
-      </p:ext>
-    </p:extLst>
-  </p:cSld>
-  <p:clrMapOvr>
-    <a:masterClrMapping/>
-  </p:clrMapOvr>
-</p:sld>
-</file>
-
-<file path=ppt/slides/slide3.xml><?xml version="1.0" encoding="utf-8"?>
-<p:sld xmlns:a="http://schemas.openxmlformats.org/drawingml/2006/main" xmlns:r="http://schemas.openxmlformats.org/officeDocument/2006/relationships" xmlns:p="http://schemas.openxmlformats.org/presentationml/2006/main">
-  <p:cSld>
-    <p:bg>
-      <p:bgPr>
-        <a:solidFill>
-          <a:schemeClr val="bg1"/>
-        </a:solidFill>
-        <a:effectLst/>
-      </p:bgPr>
-    </p:bg>
-    <p:spTree>
-      <p:nvGrpSpPr>
-        <p:cNvPr id="1" name=""/>
-        <p:cNvGrpSpPr/>
-        <p:nvPr/>
-      </p:nvGrpSpPr>
-      <p:grpSpPr>
-        <a:xfrm>
-          <a:off x="0" y="0"/>
-          <a:ext cx="0" cy="0"/>
-          <a:chOff x="0" y="0"/>
-          <a:chExt cx="0" cy="0"/>
-        </a:xfrm>
-      </p:grpSpPr>
-      <p:sp>
-        <p:nvSpPr>
-          <p:cNvPr id="11" name="Freeform: Shape 10">
-            <a:extLst>
-              <a:ext uri="{FF2B5EF4-FFF2-40B4-BE49-F238E27FC236}">
-                <a16:creationId xmlns:a16="http://schemas.microsoft.com/office/drawing/2014/main" id="{AE192E3E-68A9-4F36-936C-1C8D0B9EF132}"/>
-              </a:ext>
-              <a:ext uri="{C183D7F6-B498-43B3-948B-1728B52AA6E4}">
-                <adec:decorative xmlns:adec="http://schemas.microsoft.com/office/drawing/2017/decorative" val="1"/>
-              </a:ext>
-            </a:extLst>
-          </p:cNvPr>
-          <p:cNvSpPr>
-            <a:spLocks noGrp="1" noRot="1" noChangeAspect="1" noMove="1" noResize="1" noEditPoints="1" noAdjustHandles="1" noChangeArrowheads="1" noChangeShapeType="1" noTextEdit="1"/>
-          </p:cNvSpPr>
-          <p:nvPr>
-            <p:extLst>
-              <p:ext uri="{386F3935-93C4-4BCD-93E2-E3B085C9AB24}">
-                <p16:designElem xmlns:p16="http://schemas.microsoft.com/office/powerpoint/2015/main" val="1"/>
-              </p:ext>
-            </p:extLst>
-          </p:nvPr>
-        </p:nvSpPr>
-        <p:spPr>
-          <a:xfrm>
-            <a:off x="8803792" y="3455896"/>
-            <a:ext cx="3388208" cy="3406341"/>
-          </a:xfrm>
-          <a:custGeom>
-            <a:avLst/>
-            <a:gdLst>
-              <a:gd name="connsiteX0" fmla="*/ 3388058 w 3388208"/>
-              <a:gd name="connsiteY0" fmla="*/ 0 h 3406341"/>
-              <a:gd name="connsiteX1" fmla="*/ 3388208 w 3388208"/>
-              <a:gd name="connsiteY1" fmla="*/ 0 h 3406341"/>
-              <a:gd name="connsiteX2" fmla="*/ 3388208 w 3388208"/>
-              <a:gd name="connsiteY2" fmla="*/ 3406341 h 3406341"/>
-              <a:gd name="connsiteX3" fmla="*/ 0 w 3388208"/>
-              <a:gd name="connsiteY3" fmla="*/ 3406341 h 3406341"/>
-              <a:gd name="connsiteX4" fmla="*/ 79006 w 3388208"/>
-              <a:gd name="connsiteY4" fmla="*/ 3404386 h 3406341"/>
-              <a:gd name="connsiteX5" fmla="*/ 3383947 w 3388208"/>
-              <a:gd name="connsiteY5" fmla="*/ 164274 h 3406341"/>
-            </a:gdLst>
-            <a:ahLst/>
-            <a:cxnLst>
-              <a:cxn ang="0">
-                <a:pos x="connsiteX0" y="connsiteY0"/>
-              </a:cxn>
-              <a:cxn ang="0">
-                <a:pos x="connsiteX1" y="connsiteY1"/>
-              </a:cxn>
-              <a:cxn ang="0">
-                <a:pos x="connsiteX2" y="connsiteY2"/>
-              </a:cxn>
-              <a:cxn ang="0">
-                <a:pos x="connsiteX3" y="connsiteY3"/>
-              </a:cxn>
-              <a:cxn ang="0">
-                <a:pos x="connsiteX4" y="connsiteY4"/>
-              </a:cxn>
-              <a:cxn ang="0">
-                <a:pos x="connsiteX5" y="connsiteY5"/>
-              </a:cxn>
-            </a:cxnLst>
-            <a:rect l="l" t="t" r="r" b="b"/>
-            <a:pathLst>
-              <a:path w="3388208" h="3406341">
-                <a:moveTo>
-                  <a:pt x="3388058" y="0"/>
-                </a:moveTo>
-                <a:lnTo>
-                  <a:pt x="3388208" y="0"/>
-                </a:lnTo>
-                <a:lnTo>
-                  <a:pt x="3388208" y="3406341"/>
-                </a:lnTo>
-                <a:lnTo>
-                  <a:pt x="0" y="3406341"/>
-                </a:lnTo>
-                <a:lnTo>
-                  <a:pt x="79006" y="3404386"/>
-                </a:lnTo>
-                <a:cubicBezTo>
-                  <a:pt x="1864742" y="3315784"/>
-                  <a:pt x="3296223" y="1912901"/>
-                  <a:pt x="3383947" y="164274"/>
-                </a:cubicBezTo>
-                <a:close/>
-              </a:path>
-            </a:pathLst>
-          </a:custGeom>
-          <a:solidFill>
-            <a:schemeClr val="accent5"/>
-          </a:solidFill>
-          <a:ln>
-            <a:noFill/>
-          </a:ln>
-        </p:spPr>
-        <p:style>
-          <a:lnRef idx="2">
-            <a:schemeClr val="accent1">
-              <a:shade val="50000"/>
-            </a:schemeClr>
-          </a:lnRef>
-          <a:fillRef idx="1">
-            <a:schemeClr val="accent1"/>
-          </a:fillRef>
-          <a:effectRef idx="0">
-            <a:schemeClr val="accent1"/>
-          </a:effectRef>
-          <a:fontRef idx="minor">
-            <a:schemeClr val="lt1"/>
-          </a:fontRef>
-        </p:style>
-        <p:txBody>
-          <a:bodyPr wrap="square" rtlCol="0" anchor="ctr">
-            <a:noAutofit/>
-          </a:bodyPr>
-          <a:lstStyle/>
-          <a:p>
-            <a:pPr algn="ctr"/>
-            <a:endParaRPr lang="en-US"/>
-          </a:p>
-        </p:txBody>
-      </p:sp>
-      <p:sp useBgFill="1">
-        <p:nvSpPr>
-          <p:cNvPr id="13" name="Rectangle 12">
-            <a:extLst>
-              <a:ext uri="{FF2B5EF4-FFF2-40B4-BE49-F238E27FC236}">
-                <a16:creationId xmlns:a16="http://schemas.microsoft.com/office/drawing/2014/main" id="{DA1766D0-745A-4921-A68E-56642A6508CF}"/>
-              </a:ext>
-              <a:ext uri="{C183D7F6-B498-43B3-948B-1728B52AA6E4}">
-                <adec:decorative xmlns:adec="http://schemas.microsoft.com/office/drawing/2017/decorative" val="1"/>
-              </a:ext>
-            </a:extLst>
-          </p:cNvPr>
-          <p:cNvSpPr>
-            <a:spLocks noGrp="1" noRot="1" noChangeAspect="1" noMove="1" noResize="1" noEditPoints="1" noAdjustHandles="1" noChangeArrowheads="1" noChangeShapeType="1" noTextEdit="1"/>
-          </p:cNvSpPr>
-          <p:nvPr>
-            <p:extLst>
-              <p:ext uri="{386F3935-93C4-4BCD-93E2-E3B085C9AB24}">
-                <p16:designElem xmlns:p16="http://schemas.microsoft.com/office/powerpoint/2015/main" val="1"/>
-              </p:ext>
-            </p:extLst>
-          </p:nvPr>
-        </p:nvSpPr>
-        <p:spPr>
-          <a:xfrm>
-            <a:off x="0" y="0"/>
-            <a:ext cx="12192000" cy="6858000"/>
-          </a:xfrm>
-          <a:prstGeom prst="rect">
-            <a:avLst/>
-          </a:prstGeom>
-          <a:ln w="12700" cap="flat" cmpd="sng" algn="ctr">
-            <a:noFill/>
-            <a:prstDash val="solid"/>
-            <a:miter lim="800000"/>
-          </a:ln>
-          <a:effectLst/>
-          <a:extLst>
-            <a:ext uri="{91240B29-F687-4F45-9708-019B960494DF}">
-              <a14:hiddenLine xmlns:a14="http://schemas.microsoft.com/office/drawing/2010/main" w="12700" cap="flat" cmpd="sng" algn="ctr">
-                <a:solidFill>
-                  <a:schemeClr val="accent1">
-                    <a:shade val="50000"/>
-                  </a:schemeClr>
-                </a:solidFill>
-                <a:prstDash val="solid"/>
-                <a:miter lim="800000"/>
-              </a14:hiddenLine>
-            </a:ext>
-          </a:extLst>
-        </p:spPr>
-        <p:style>
-          <a:lnRef idx="2">
-            <a:schemeClr val="accent1">
-              <a:shade val="50000"/>
-            </a:schemeClr>
-          </a:lnRef>
-          <a:fillRef idx="1">
-            <a:schemeClr val="accent1"/>
-          </a:fillRef>
-          <a:effectRef idx="0">
-            <a:schemeClr val="accent1"/>
-          </a:effectRef>
-          <a:fontRef idx="minor">
-            <a:schemeClr val="lt1"/>
-          </a:fontRef>
-        </p:style>
-        <p:txBody>
-          <a:bodyPr rtlCol="0" anchor="ctr"/>
-          <a:lstStyle/>
-          <a:p>
-            <a:pPr algn="ctr"/>
-            <a:endParaRPr lang="en-US"/>
-          </a:p>
-        </p:txBody>
-      </p:sp>
-      <p:sp>
-        <p:nvSpPr>
           <p:cNvPr id="2" name="Title 1">
             <a:extLst>
               <a:ext uri="{FF2B5EF4-FFF2-40B4-BE49-F238E27FC236}">
@@ -8560,16 +8014,6 @@
             <a:r>
               <a:rPr lang="en-US" dirty="0"/>
               <a:t>Bombards the user with options</a:t>
-            </a:r>
-          </a:p>
-          <a:p>
-            <a:pPr marL="285750" indent="-285750">
-              <a:buFont typeface="Arial" panose="020B0604020202020204" pitchFamily="34" charset="0"/>
-              <a:buChar char="•"/>
-            </a:pPr>
-            <a:r>
-              <a:rPr lang="en-US" dirty="0"/>
-              <a:t>Can be a heavy suite to run</a:t>
             </a:r>
           </a:p>
         </p:txBody>
@@ -9204,13 +8648,19 @@
         </p:spPr>
         <p:txBody>
           <a:bodyPr vert="horz" lIns="91440" tIns="45720" rIns="91440" bIns="45720" rtlCol="0">
-            <a:normAutofit/>
+            <a:normAutofit fontScale="92500" lnSpcReduction="20000"/>
           </a:bodyPr>
           <a:lstStyle/>
           <a:p>
             <a:r>
               <a:rPr lang="en-US" dirty="0"/>
               <a:t>I enjoy programming, and have really wanted to explore the depths of the Python language</a:t>
+            </a:r>
+          </a:p>
+          <a:p>
+            <a:r>
+              <a:rPr lang="en-US" dirty="0"/>
+              <a:t>I wanted to make a tool that I would use regularly</a:t>
             </a:r>
           </a:p>
           <a:p>
@@ -10147,10 +9597,10 @@
       </p:grpSpPr>
       <p:sp>
         <p:nvSpPr>
-          <p:cNvPr id="4" name="Title 3">
-            <a:extLst>
-              <a:ext uri="{FF2B5EF4-FFF2-40B4-BE49-F238E27FC236}">
-                <a16:creationId xmlns:a16="http://schemas.microsoft.com/office/drawing/2014/main" id="{5BD8C25A-917F-4BD5-B97F-25CB5FD0A84F}"/>
+          <p:cNvPr id="5" name="Title 4">
+            <a:extLst>
+              <a:ext uri="{FF2B5EF4-FFF2-40B4-BE49-F238E27FC236}">
+                <a16:creationId xmlns:a16="http://schemas.microsoft.com/office/drawing/2014/main" id="{5A131A8B-9AFF-4F35-929A-1D578B9CBB25}"/>
               </a:ext>
             </a:extLst>
           </p:cNvPr>
@@ -10161,150 +9611,45 @@
             <p:ph type="title"/>
           </p:nvPr>
         </p:nvSpPr>
+        <p:spPr>
+          <a:xfrm>
+            <a:off x="1084726" y="2443925"/>
+            <a:ext cx="9143999" cy="985075"/>
+          </a:xfrm>
+        </p:spPr>
+        <p:txBody>
+          <a:bodyPr/>
+          <a:lstStyle/>
+          <a:p>
+            <a:pPr algn="ctr"/>
+            <a:r>
+              <a:rPr lang="en-US" dirty="0"/>
+              <a:t>Program Demo</a:t>
+            </a:r>
+          </a:p>
+        </p:txBody>
+      </p:sp>
+      <p:sp>
+        <p:nvSpPr>
+          <p:cNvPr id="6" name="Text Placeholder 5">
+            <a:extLst>
+              <a:ext uri="{FF2B5EF4-FFF2-40B4-BE49-F238E27FC236}">
+                <a16:creationId xmlns:a16="http://schemas.microsoft.com/office/drawing/2014/main" id="{5AA3C9AC-1BE6-4F84-9A63-21FF2E5A8FA8}"/>
+              </a:ext>
+            </a:extLst>
+          </p:cNvPr>
+          <p:cNvSpPr>
+            <a:spLocks noGrp="1"/>
+          </p:cNvSpPr>
+          <p:nvPr>
+            <p:ph type="body" idx="1"/>
+          </p:nvPr>
+        </p:nvSpPr>
         <p:spPr/>
         <p:txBody>
           <a:bodyPr/>
           <a:lstStyle/>
           <a:p>
-            <a:pPr algn="ctr"/>
-            <a:r>
-              <a:rPr lang="en-US" dirty="0"/>
-              <a:t>Hardware &amp; Software Requirements</a:t>
-            </a:r>
-          </a:p>
-        </p:txBody>
-      </p:sp>
-      <p:sp>
-        <p:nvSpPr>
-          <p:cNvPr id="5" name="Content Placeholder 4">
-            <a:extLst>
-              <a:ext uri="{FF2B5EF4-FFF2-40B4-BE49-F238E27FC236}">
-                <a16:creationId xmlns:a16="http://schemas.microsoft.com/office/drawing/2014/main" id="{0C89A52B-5DF1-4A15-8BB4-2B8B0F8886FC}"/>
-              </a:ext>
-            </a:extLst>
-          </p:cNvPr>
-          <p:cNvSpPr>
-            <a:spLocks noGrp="1"/>
-          </p:cNvSpPr>
-          <p:nvPr>
-            <p:ph sz="half" idx="1"/>
-          </p:nvPr>
-        </p:nvSpPr>
-        <p:spPr/>
-        <p:txBody>
-          <a:bodyPr/>
-          <a:lstStyle/>
-          <a:p>
-            <a:pPr marL="0" indent="0" algn="ctr">
-              <a:buNone/>
-            </a:pPr>
-            <a:r>
-              <a:rPr lang="en-US" dirty="0"/>
-              <a:t>Hardware</a:t>
-            </a:r>
-          </a:p>
-          <a:p>
-            <a:r>
-              <a:rPr lang="en-US" dirty="0"/>
-              <a:t>Any CPU within the last 6 or more years</a:t>
-            </a:r>
-          </a:p>
-          <a:p>
-            <a:r>
-              <a:rPr lang="en-US" dirty="0"/>
-              <a:t>At least 1 GB of RAM</a:t>
-            </a:r>
-          </a:p>
-          <a:p>
-            <a:r>
-              <a:rPr lang="en-US" dirty="0"/>
-              <a:t>Storage space</a:t>
-            </a:r>
-          </a:p>
-          <a:p>
-            <a:r>
-              <a:rPr lang="en-US" dirty="0"/>
-              <a:t>Keyboard to input values</a:t>
-            </a:r>
-          </a:p>
-          <a:p>
-            <a:r>
-              <a:rPr lang="en-US" dirty="0"/>
-              <a:t>Display to view the GUI</a:t>
-            </a:r>
-          </a:p>
-        </p:txBody>
-      </p:sp>
-      <p:sp>
-        <p:nvSpPr>
-          <p:cNvPr id="6" name="Content Placeholder 5">
-            <a:extLst>
-              <a:ext uri="{FF2B5EF4-FFF2-40B4-BE49-F238E27FC236}">
-                <a16:creationId xmlns:a16="http://schemas.microsoft.com/office/drawing/2014/main" id="{3F4B792E-D359-4F1C-9085-613170017F6C}"/>
-              </a:ext>
-            </a:extLst>
-          </p:cNvPr>
-          <p:cNvSpPr>
-            <a:spLocks noGrp="1"/>
-          </p:cNvSpPr>
-          <p:nvPr>
-            <p:ph sz="half" idx="2"/>
-          </p:nvPr>
-        </p:nvSpPr>
-        <p:spPr/>
-        <p:txBody>
-          <a:bodyPr/>
-          <a:lstStyle/>
-          <a:p>
-            <a:pPr marL="0" indent="0" algn="ctr">
-              <a:buNone/>
-            </a:pPr>
-            <a:r>
-              <a:rPr lang="en-US" dirty="0"/>
-              <a:t>Software</a:t>
-            </a:r>
-          </a:p>
-          <a:p>
-            <a:r>
-              <a:rPr lang="en-US" dirty="0"/>
-              <a:t>A Linux-based OS</a:t>
-            </a:r>
-          </a:p>
-          <a:p>
-            <a:r>
-              <a:rPr lang="en-US" dirty="0"/>
-              <a:t>Python3.8</a:t>
-            </a:r>
-          </a:p>
-          <a:p>
-            <a:r>
-              <a:rPr lang="en-US" dirty="0"/>
-              <a:t>SQLite and </a:t>
-            </a:r>
-            <a:r>
-              <a:rPr lang="en-US" dirty="0" err="1"/>
-              <a:t>SQLAlchemy</a:t>
-            </a:r>
-            <a:endParaRPr lang="en-US" dirty="0"/>
-          </a:p>
-          <a:p>
-            <a:r>
-              <a:rPr lang="en-US" dirty="0"/>
-              <a:t>Pandas</a:t>
-            </a:r>
-          </a:p>
-          <a:p>
-            <a:r>
-              <a:rPr lang="en-US" dirty="0" err="1"/>
-              <a:t>Xsltproc</a:t>
-            </a:r>
-            <a:endParaRPr lang="en-US" dirty="0"/>
-          </a:p>
-          <a:p>
-            <a:r>
-              <a:rPr lang="en-US" dirty="0" err="1"/>
-              <a:t>PySimpleGUI</a:t>
-            </a:r>
             <a:endParaRPr lang="en-US" dirty="0"/>
           </a:p>
         </p:txBody>
@@ -10312,7 +9657,7 @@
     </p:spTree>
     <p:extLst>
       <p:ext uri="{BB962C8B-B14F-4D97-AF65-F5344CB8AC3E}">
-        <p14:creationId xmlns:p14="http://schemas.microsoft.com/office/powerpoint/2010/main" val="3223297669"/>
+        <p14:creationId xmlns:p14="http://schemas.microsoft.com/office/powerpoint/2010/main" val="232236793"/>
       </p:ext>
     </p:extLst>
   </p:cSld>
@@ -10341,10 +9686,10 @@
       </p:grpSpPr>
       <p:sp>
         <p:nvSpPr>
-          <p:cNvPr id="5" name="Title 4">
-            <a:extLst>
-              <a:ext uri="{FF2B5EF4-FFF2-40B4-BE49-F238E27FC236}">
-                <a16:creationId xmlns:a16="http://schemas.microsoft.com/office/drawing/2014/main" id="{5A131A8B-9AFF-4F35-929A-1D578B9CBB25}"/>
+          <p:cNvPr id="4" name="Title 3">
+            <a:extLst>
+              <a:ext uri="{FF2B5EF4-FFF2-40B4-BE49-F238E27FC236}">
+                <a16:creationId xmlns:a16="http://schemas.microsoft.com/office/drawing/2014/main" id="{5BD8C25A-917F-4BD5-B97F-25CB5FD0A84F}"/>
               </a:ext>
             </a:extLst>
           </p:cNvPr>
@@ -10355,12 +9700,7 @@
             <p:ph type="title"/>
           </p:nvPr>
         </p:nvSpPr>
-        <p:spPr>
-          <a:xfrm>
-            <a:off x="1084726" y="2443925"/>
-            <a:ext cx="9143999" cy="985075"/>
-          </a:xfrm>
-        </p:spPr>
+        <p:spPr/>
         <p:txBody>
           <a:bodyPr/>
           <a:lstStyle/>
@@ -10368,17 +9708,17 @@
             <a:pPr algn="ctr"/>
             <a:r>
               <a:rPr lang="en-US" dirty="0"/>
-              <a:t>Program Demo</a:t>
-            </a:r>
-          </a:p>
-        </p:txBody>
-      </p:sp>
-      <p:sp>
-        <p:nvSpPr>
-          <p:cNvPr id="6" name="Text Placeholder 5">
-            <a:extLst>
-              <a:ext uri="{FF2B5EF4-FFF2-40B4-BE49-F238E27FC236}">
-                <a16:creationId xmlns:a16="http://schemas.microsoft.com/office/drawing/2014/main" id="{5AA3C9AC-1BE6-4F84-9A63-21FF2E5A8FA8}"/>
+              <a:t>Hardware &amp; Software Requirements</a:t>
+            </a:r>
+          </a:p>
+        </p:txBody>
+      </p:sp>
+      <p:sp>
+        <p:nvSpPr>
+          <p:cNvPr id="5" name="Content Placeholder 4">
+            <a:extLst>
+              <a:ext uri="{FF2B5EF4-FFF2-40B4-BE49-F238E27FC236}">
+                <a16:creationId xmlns:a16="http://schemas.microsoft.com/office/drawing/2014/main" id="{0C89A52B-5DF1-4A15-8BB4-2B8B0F8886FC}"/>
               </a:ext>
             </a:extLst>
           </p:cNvPr>
@@ -10386,7 +9726,7 @@
             <a:spLocks noGrp="1"/>
           </p:cNvSpPr>
           <p:nvPr>
-            <p:ph type="body" idx="1"/>
+            <p:ph sz="half" idx="1"/>
           </p:nvPr>
         </p:nvSpPr>
         <p:spPr/>
@@ -10394,6 +9734,116 @@
           <a:bodyPr/>
           <a:lstStyle/>
           <a:p>
+            <a:pPr marL="0" indent="0" algn="ctr">
+              <a:buNone/>
+            </a:pPr>
+            <a:r>
+              <a:rPr lang="en-US" dirty="0"/>
+              <a:t>Hardware</a:t>
+            </a:r>
+          </a:p>
+          <a:p>
+            <a:r>
+              <a:rPr lang="en-US" dirty="0"/>
+              <a:t>Any CPU within the last 6 or more years</a:t>
+            </a:r>
+          </a:p>
+          <a:p>
+            <a:r>
+              <a:rPr lang="en-US" dirty="0"/>
+              <a:t>At least 1 GB of RAM</a:t>
+            </a:r>
+          </a:p>
+          <a:p>
+            <a:r>
+              <a:rPr lang="en-US" dirty="0"/>
+              <a:t>Storage space</a:t>
+            </a:r>
+          </a:p>
+          <a:p>
+            <a:r>
+              <a:rPr lang="en-US" dirty="0"/>
+              <a:t>Keyboard to input values</a:t>
+            </a:r>
+          </a:p>
+          <a:p>
+            <a:r>
+              <a:rPr lang="en-US" dirty="0"/>
+              <a:t>Display to view the GUI</a:t>
+            </a:r>
+          </a:p>
+        </p:txBody>
+      </p:sp>
+      <p:sp>
+        <p:nvSpPr>
+          <p:cNvPr id="6" name="Content Placeholder 5">
+            <a:extLst>
+              <a:ext uri="{FF2B5EF4-FFF2-40B4-BE49-F238E27FC236}">
+                <a16:creationId xmlns:a16="http://schemas.microsoft.com/office/drawing/2014/main" id="{3F4B792E-D359-4F1C-9085-613170017F6C}"/>
+              </a:ext>
+            </a:extLst>
+          </p:cNvPr>
+          <p:cNvSpPr>
+            <a:spLocks noGrp="1"/>
+          </p:cNvSpPr>
+          <p:nvPr>
+            <p:ph sz="half" idx="2"/>
+          </p:nvPr>
+        </p:nvSpPr>
+        <p:spPr/>
+        <p:txBody>
+          <a:bodyPr/>
+          <a:lstStyle/>
+          <a:p>
+            <a:pPr marL="0" indent="0" algn="ctr">
+              <a:buNone/>
+            </a:pPr>
+            <a:r>
+              <a:rPr lang="en-US" dirty="0"/>
+              <a:t>Software</a:t>
+            </a:r>
+          </a:p>
+          <a:p>
+            <a:r>
+              <a:rPr lang="en-US" dirty="0"/>
+              <a:t>A Linux-based OS</a:t>
+            </a:r>
+          </a:p>
+          <a:p>
+            <a:r>
+              <a:rPr lang="en-US" dirty="0"/>
+              <a:t>Python3.8</a:t>
+            </a:r>
+          </a:p>
+          <a:p>
+            <a:r>
+              <a:rPr lang="en-US" dirty="0"/>
+              <a:t>SQLite and </a:t>
+            </a:r>
+            <a:r>
+              <a:rPr lang="en-US" dirty="0" err="1"/>
+              <a:t>SQLAlchemy</a:t>
+            </a:r>
+            <a:endParaRPr lang="en-US" dirty="0"/>
+          </a:p>
+          <a:p>
+            <a:r>
+              <a:rPr lang="en-US" dirty="0"/>
+              <a:t>Pandas</a:t>
+            </a:r>
+          </a:p>
+          <a:p>
+            <a:r>
+              <a:rPr lang="en-US" dirty="0" err="1"/>
+              <a:t>Xsltproc</a:t>
+            </a:r>
+            <a:endParaRPr lang="en-US" dirty="0"/>
+          </a:p>
+          <a:p>
+            <a:r>
+              <a:rPr lang="en-US" dirty="0" err="1"/>
+              <a:t>PySimpleGUI</a:t>
+            </a:r>
             <a:endParaRPr lang="en-US" dirty="0"/>
           </a:p>
         </p:txBody>
@@ -10401,7 +9851,7 @@
     </p:spTree>
     <p:extLst>
       <p:ext uri="{BB962C8B-B14F-4D97-AF65-F5344CB8AC3E}">
-        <p14:creationId xmlns:p14="http://schemas.microsoft.com/office/powerpoint/2010/main" val="232236793"/>
+        <p14:creationId xmlns:p14="http://schemas.microsoft.com/office/powerpoint/2010/main" val="3223297669"/>
       </p:ext>
     </p:extLst>
   </p:cSld>

</xml_diff>